<commit_message>
completed powerpoint--elisa! Time to practice!
</commit_message>
<xml_diff>
--- a/Conference_prep/Amadis_tei_conf_images.pptx
+++ b/Conference_prep/Amadis_tei_conf_images.pptx
@@ -5,7 +5,7 @@
     <p:sldMasterId id="2147483846" r:id="rId1"/>
   </p:sldMasterIdLst>
   <p:notesMasterIdLst>
-    <p:notesMasterId r:id="rId22"/>
+    <p:notesMasterId r:id="rId24"/>
   </p:notesMasterIdLst>
   <p:sldIdLst>
     <p:sldId id="283" r:id="rId2"/>
@@ -20,14 +20,16 @@
     <p:sldId id="264" r:id="rId11"/>
     <p:sldId id="285" r:id="rId12"/>
     <p:sldId id="290" r:id="rId13"/>
-    <p:sldId id="289" r:id="rId14"/>
-    <p:sldId id="287" r:id="rId15"/>
-    <p:sldId id="286" r:id="rId16"/>
+    <p:sldId id="287" r:id="rId14"/>
+    <p:sldId id="286" r:id="rId15"/>
+    <p:sldId id="291" r:id="rId16"/>
     <p:sldId id="284" r:id="rId17"/>
     <p:sldId id="288" r:id="rId18"/>
     <p:sldId id="261" r:id="rId19"/>
     <p:sldId id="268" r:id="rId20"/>
-    <p:sldId id="269" r:id="rId21"/>
+    <p:sldId id="292" r:id="rId21"/>
+    <p:sldId id="269" r:id="rId22"/>
+    <p:sldId id="293" r:id="rId23"/>
   </p:sldIdLst>
   <p:sldSz cx="9144000" cy="6858000" type="screen4x3"/>
   <p:notesSz cx="6858000" cy="9144000"/>
@@ -807,6 +809,34 @@
           <a:bodyPr/>
           <a:lstStyle/>
           <a:p>
+            <a:pPr marL="0" marR="0" indent="0" algn="l" defTabSz="457200" rtl="0" eaLnBrk="1" fontAlgn="auto" latinLnBrk="0" hangingPunct="1">
+              <a:lnSpc>
+                <a:spcPct val="100000"/>
+              </a:lnSpc>
+              <a:spcBef>
+                <a:spcPts val="0"/>
+              </a:spcBef>
+              <a:spcAft>
+                <a:spcPts val="0"/>
+              </a:spcAft>
+              <a:buClrTx/>
+              <a:buSzTx/>
+              <a:buFontTx/>
+              <a:buNone/>
+              <a:tabLst/>
+              <a:defRPr/>
+            </a:pPr>
+            <a:r>
+              <a:rPr lang="en-US" dirty="0" smtClean="0"/>
+              <a:t>Processing the alignment markup: What we’re learning so far</a:t>
+            </a:r>
+            <a:r>
+              <a:rPr lang="en-US" baseline="0" dirty="0" smtClean="0"/>
+              <a:t>. As we are designing our website, we want to use this page as our table of  contents, so that site visitors can quickly identify the chapters most altered by Southey. The orange band in the center indicates the proportion of overlap. The word count comparisons interest us, though we are not sure how significant they are: We are interested in gauging the extent of Southey’s boasted “compression” of Montalvo, so we use XSLT to generate these graphs by counting white spaces for makeshift word counts in between &lt;anchor/&gt; elements of different kinds. Where Southey omitted passages we don’t apply tags, but we note where he skips over unit passages in Montalvo.</a:t>
+            </a:r>
+            <a:endParaRPr lang="en-US" dirty="0" smtClean="0"/>
+          </a:p>
+          <a:p>
             <a:endParaRPr lang="en-US" dirty="0"/>
           </a:p>
         </p:txBody>
@@ -828,7 +858,7 @@
           <a:p>
             <a:fld id="{F643181A-FD5F-E940-B6DC-320B23DAA7AA}" type="slidenum">
               <a:rPr lang="en-US" smtClean="0"/>
-              <a:t>14</a:t>
+              <a:t>13</a:t>
             </a:fld>
             <a:endParaRPr lang="en-US"/>
           </a:p>
@@ -893,7 +923,19 @@
           <a:p>
             <a:r>
               <a:rPr lang="en-US" dirty="0" smtClean="0"/>
-              <a:t>Feature structure</a:t>
+              <a:t>To</a:t>
+            </a:r>
+            <a:r>
+              <a:rPr lang="en-US" baseline="0" dirty="0" smtClean="0"/>
+              <a:t> analyze the aligned passages further, and help Stacey to survey them to plot patterns, we use the TEI’s handy Feature Structure markup, to produce one Feature Structure file for each chapter. @n indicates a word count, and @</a:t>
+            </a:r>
+            <a:r>
+              <a:rPr lang="en-US" baseline="0" dirty="0" err="1" smtClean="0"/>
+              <a:t>ana</a:t>
+            </a:r>
+            <a:r>
+              <a:rPr lang="en-US" baseline="0" dirty="0" smtClean="0"/>
+              <a:t> indicates by how much proportionally the passage was either compressed or expanded from a corresponding passage in Montalvo. Within an fs element we pull each “anchored event” (so to speak) from Southey,, and where these are not additions or omissions, they contain side-by-side units of matched text. We add a &lt;string&gt; element for writing in our comments on the translation, and we plan to develop a system of classifying the kinds of alterations Southey makes in his version of the translation. For example (though this is not shown), we find that frequently Montalvo represents every speech-act directly, while Southey turns this in to indirect discourse. Other kinds of alterations to syntax.</a:t>
             </a:r>
             <a:endParaRPr lang="en-US" dirty="0"/>
           </a:p>
@@ -916,7 +958,7 @@
           <a:p>
             <a:fld id="{F643181A-FD5F-E940-B6DC-320B23DAA7AA}" type="slidenum">
               <a:rPr lang="en-US" smtClean="0"/>
-              <a:t>15</a:t>
+              <a:t>14</a:t>
             </a:fld>
             <a:endParaRPr lang="en-US"/>
           </a:p>
@@ -981,23 +1023,27 @@
           <a:p>
             <a:r>
               <a:rPr lang="en-US" dirty="0" smtClean="0"/>
-              <a:t>Output</a:t>
+              <a:t>Generating</a:t>
             </a:r>
             <a:r>
               <a:rPr lang="en-US" baseline="0" dirty="0" smtClean="0"/>
-              <a:t> table by Helena </a:t>
+              <a:t> Feature Structures markup: just the “f’ element and @</a:t>
             </a:r>
             <a:r>
               <a:rPr lang="en-US" baseline="0" dirty="0" err="1" smtClean="0"/>
-              <a:t>Bermúdez</a:t>
+              <a:t>ana</a:t>
             </a:r>
             <a:r>
               <a:rPr lang="en-US" baseline="0" dirty="0" smtClean="0"/>
-              <a:t> </a:t>
+              <a:t>: How we’re calculating @</a:t>
             </a:r>
             <a:r>
               <a:rPr lang="en-US" baseline="0" dirty="0" err="1" smtClean="0"/>
-              <a:t>Sabel</a:t>
+              <a:t>ana</a:t>
+            </a:r>
+            <a:r>
+              <a:rPr lang="en-US" baseline="0" dirty="0" smtClean="0"/>
+              <a:t>, our signal of proportional difference in size between Montalvo and Southey. (The function round-half-to-even() can take two arguments—the “2” at the end indicates the number of decimal places.)</a:t>
             </a:r>
             <a:endParaRPr lang="en-US" dirty="0"/>
           </a:p>
@@ -1020,7 +1066,7 @@
           <a:p>
             <a:fld id="{F643181A-FD5F-E940-B6DC-320B23DAA7AA}" type="slidenum">
               <a:rPr lang="en-US" smtClean="0"/>
-              <a:t>16</a:t>
+              <a:t>15</a:t>
             </a:fld>
             <a:endParaRPr lang="en-US"/>
           </a:p>
@@ -1029,7 +1075,7 @@
     </p:spTree>
     <p:extLst>
       <p:ext uri="{BB962C8B-B14F-4D97-AF65-F5344CB8AC3E}">
-        <p14:creationId xmlns:p14="http://schemas.microsoft.com/office/powerpoint/2010/main" val="147813387"/>
+        <p14:creationId xmlns:p14="http://schemas.microsoft.com/office/powerpoint/2010/main" val="3631775004"/>
       </p:ext>
     </p:extLst>
   </p:cSld>
@@ -1085,7 +1131,23 @@
           <a:p>
             <a:r>
               <a:rPr lang="en-US" dirty="0" smtClean="0"/>
-              <a:t>From the Preface (xxi)</a:t>
+              <a:t>Output</a:t>
+            </a:r>
+            <a:r>
+              <a:rPr lang="en-US" baseline="0" dirty="0" smtClean="0"/>
+              <a:t> table by Helena </a:t>
+            </a:r>
+            <a:r>
+              <a:rPr lang="en-US" baseline="0" dirty="0" err="1" smtClean="0"/>
+              <a:t>Bermúdez</a:t>
+            </a:r>
+            <a:r>
+              <a:rPr lang="en-US" baseline="0" dirty="0" smtClean="0"/>
+              <a:t> </a:t>
+            </a:r>
+            <a:r>
+              <a:rPr lang="en-US" baseline="0" dirty="0" smtClean="0"/>
+              <a:t>Sabel: This is an HTML view pulled from our feature structures markup for a chapter. The higher the number, the more compression Southey applied.</a:t>
             </a:r>
             <a:endParaRPr lang="en-US" dirty="0"/>
           </a:p>
@@ -1108,7 +1170,7 @@
           <a:p>
             <a:fld id="{F643181A-FD5F-E940-B6DC-320B23DAA7AA}" type="slidenum">
               <a:rPr lang="en-US" smtClean="0"/>
-              <a:t>17</a:t>
+              <a:t>16</a:t>
             </a:fld>
             <a:endParaRPr lang="en-US"/>
           </a:p>
@@ -1173,19 +1235,7 @@
           <a:p>
             <a:r>
               <a:rPr lang="en-US" dirty="0" smtClean="0"/>
-              <a:t>Image 9: From </a:t>
-            </a:r>
-            <a:r>
-              <a:rPr lang="en-US" dirty="0" err="1" smtClean="0"/>
-              <a:t>Montalvo</a:t>
-            </a:r>
-            <a:r>
-              <a:rPr lang="en-US" dirty="0" smtClean="0"/>
-              <a:t> 20/ Southey 21. Show where</a:t>
-            </a:r>
-            <a:r>
-              <a:rPr lang="en-US" baseline="0" dirty="0" smtClean="0"/>
-              <a:t> this corresponds—this is typical of Southey’s omission criteria. Repetition, participation of minor characters.</a:t>
+              <a:t>From the Preface (xxi)</a:t>
             </a:r>
             <a:endParaRPr lang="en-US" dirty="0"/>
           </a:p>
@@ -1208,7 +1258,7 @@
           <a:p>
             <a:fld id="{F643181A-FD5F-E940-B6DC-320B23DAA7AA}" type="slidenum">
               <a:rPr lang="en-US" smtClean="0"/>
-              <a:t>18</a:t>
+              <a:t>17</a:t>
             </a:fld>
             <a:endParaRPr lang="en-US"/>
           </a:p>
@@ -1271,6 +1321,22 @@
           <a:bodyPr/>
           <a:lstStyle/>
           <a:p>
+            <a:r>
+              <a:rPr lang="en-US" dirty="0" smtClean="0"/>
+              <a:t>Image 9: From </a:t>
+            </a:r>
+            <a:r>
+              <a:rPr lang="en-US" dirty="0" err="1" smtClean="0"/>
+              <a:t>Montalvo</a:t>
+            </a:r>
+            <a:r>
+              <a:rPr lang="en-US" dirty="0" smtClean="0"/>
+              <a:t> 20/ Southey 21. Show where</a:t>
+            </a:r>
+            <a:r>
+              <a:rPr lang="en-US" baseline="0" dirty="0" smtClean="0"/>
+              <a:t> this corresponds—this is typical of Southey’s omission criteria. Repetition, participation of minor characters.</a:t>
+            </a:r>
             <a:endParaRPr lang="en-US" dirty="0"/>
           </a:p>
         </p:txBody>
@@ -1292,7 +1358,7 @@
           <a:p>
             <a:fld id="{F643181A-FD5F-E940-B6DC-320B23DAA7AA}" type="slidenum">
               <a:rPr lang="en-US" smtClean="0"/>
-              <a:t>19</a:t>
+              <a:t>18</a:t>
             </a:fld>
             <a:endParaRPr lang="en-US"/>
           </a:p>
@@ -1355,21 +1421,148 @@
           <a:bodyPr/>
           <a:lstStyle/>
           <a:p>
+            <a:pPr marL="0" marR="0" indent="0" algn="l" defTabSz="457200" rtl="0" eaLnBrk="1" fontAlgn="auto" latinLnBrk="0" hangingPunct="1">
+              <a:lnSpc>
+                <a:spcPct val="100000"/>
+              </a:lnSpc>
+              <a:spcBef>
+                <a:spcPts val="0"/>
+              </a:spcBef>
+              <a:spcAft>
+                <a:spcPts val="0"/>
+              </a:spcAft>
+              <a:buClrTx/>
+              <a:buSzTx/>
+              <a:buFontTx/>
+              <a:buNone/>
+              <a:tabLst/>
+              <a:defRPr/>
+            </a:pPr>
+            <a:r>
+              <a:rPr lang="en-US" b="1" baseline="0" dirty="0" smtClean="0"/>
+              <a:t>**Stacey introduces this slide and the next, and then Elisa backtracks here.</a:t>
+            </a:r>
+          </a:p>
+          <a:p>
+            <a:pPr marL="0" marR="0" indent="0" algn="l" defTabSz="457200" rtl="0" eaLnBrk="1" fontAlgn="auto" latinLnBrk="0" hangingPunct="1">
+              <a:lnSpc>
+                <a:spcPct val="100000"/>
+              </a:lnSpc>
+              <a:spcBef>
+                <a:spcPts val="0"/>
+              </a:spcBef>
+              <a:spcAft>
+                <a:spcPts val="0"/>
+              </a:spcAft>
+              <a:buClrTx/>
+              <a:buSzTx/>
+              <a:buFontTx/>
+              <a:buNone/>
+              <a:tabLst/>
+              <a:defRPr/>
+            </a:pPr>
+            <a:r>
+              <a:rPr lang="en-US" b="1" baseline="0" dirty="0" smtClean="0"/>
+              <a:t>Elisa: </a:t>
+            </a:r>
+            <a:r>
+              <a:rPr lang="en-US" b="0" baseline="0" dirty="0" smtClean="0"/>
+              <a:t>These notes recently sparked debate among our little project team, because we noticed that Southey sometimes positions short quotes from Montalvo’s Spanish with word-for-word translations in some of his notes: We questioned whether this constitutes an OMISSION of Montalvo’s text from the main text of Southey’s translation, OR if it’s a way of preserving the translation at a different level of the text. We decided that such passages constitute a transposed translation, and we want to collect and study them together…Southey’s annotations take the form of footnotes, and they often have a significant function as part of the main text </a:t>
+            </a:r>
+            <a:endParaRPr lang="en-US" b="1" dirty="0" smtClean="0"/>
+          </a:p>
+          <a:p>
+            <a:endParaRPr lang="en-US" dirty="0"/>
+          </a:p>
+        </p:txBody>
+      </p:sp>
+      <p:sp>
+        <p:nvSpPr>
+          <p:cNvPr id="4" name="Slide Number Placeholder 3"/>
+          <p:cNvSpPr>
+            <a:spLocks noGrp="1"/>
+          </p:cNvSpPr>
+          <p:nvPr>
+            <p:ph type="sldNum" sz="quarter" idx="10"/>
+          </p:nvPr>
+        </p:nvSpPr>
+        <p:spPr/>
+        <p:txBody>
+          <a:bodyPr/>
+          <a:lstStyle/>
+          <a:p>
+            <a:fld id="{F643181A-FD5F-E940-B6DC-320B23DAA7AA}" type="slidenum">
+              <a:rPr lang="en-US" smtClean="0"/>
+              <a:t>19</a:t>
+            </a:fld>
+            <a:endParaRPr lang="en-US"/>
+          </a:p>
+        </p:txBody>
+      </p:sp>
+    </p:spTree>
+    <p:extLst>
+      <p:ext uri="{BB962C8B-B14F-4D97-AF65-F5344CB8AC3E}">
+        <p14:creationId xmlns:p14="http://schemas.microsoft.com/office/powerpoint/2010/main" val="147813387"/>
+      </p:ext>
+    </p:extLst>
+  </p:cSld>
+  <p:clrMapOvr>
+    <a:masterClrMapping/>
+  </p:clrMapOvr>
+</p:notes>
+</file>
+
+<file path=ppt/notesSlides/notesSlide19.xml><?xml version="1.0" encoding="utf-8"?>
+<p:notes xmlns:a="http://schemas.openxmlformats.org/drawingml/2006/main" xmlns:r="http://schemas.openxmlformats.org/officeDocument/2006/relationships" xmlns:p="http://schemas.openxmlformats.org/presentationml/2006/main">
+  <p:cSld>
+    <p:spTree>
+      <p:nvGrpSpPr>
+        <p:cNvPr id="1" name=""/>
+        <p:cNvGrpSpPr/>
+        <p:nvPr/>
+      </p:nvGrpSpPr>
+      <p:grpSpPr>
+        <a:xfrm>
+          <a:off x="0" y="0"/>
+          <a:ext cx="0" cy="0"/>
+          <a:chOff x="0" y="0"/>
+          <a:chExt cx="0" cy="0"/>
+        </a:xfrm>
+      </p:grpSpPr>
+      <p:sp>
+        <p:nvSpPr>
+          <p:cNvPr id="2" name="Slide Image Placeholder 1"/>
+          <p:cNvSpPr>
+            <a:spLocks noGrp="1" noRot="1" noChangeAspect="1"/>
+          </p:cNvSpPr>
+          <p:nvPr>
+            <p:ph type="sldImg"/>
+          </p:nvPr>
+        </p:nvSpPr>
+        <p:spPr/>
+      </p:sp>
+      <p:sp>
+        <p:nvSpPr>
+          <p:cNvPr id="3" name="Notes Placeholder 2"/>
+          <p:cNvSpPr>
+            <a:spLocks noGrp="1"/>
+          </p:cNvSpPr>
+          <p:nvPr>
+            <p:ph type="body" idx="1"/>
+          </p:nvPr>
+        </p:nvSpPr>
+        <p:spPr/>
+        <p:txBody>
+          <a:bodyPr/>
+          <a:lstStyle/>
+          <a:p>
             <a:r>
               <a:rPr lang="en-US" dirty="0" smtClean="0"/>
-              <a:t>First note references the Spanish. It’s one of the few examples we’ve found of a misreading or mistranslation</a:t>
+              <a:t>The</a:t>
             </a:r>
             <a:r>
               <a:rPr lang="en-US" baseline="0" dirty="0" smtClean="0"/>
-              <a:t> by Southey.</a:t>
-            </a:r>
-            <a:r>
-              <a:rPr lang="en-US" dirty="0" smtClean="0"/>
-              <a:t> Second note references</a:t>
-            </a:r>
-            <a:r>
-              <a:rPr lang="en-US" baseline="0" dirty="0" smtClean="0"/>
-              <a:t> another translation. </a:t>
+              <a:t> same note in the published 1803 Southey text.</a:t>
             </a:r>
             <a:endParaRPr lang="en-US" dirty="0"/>
           </a:p>
@@ -1401,7 +1594,7 @@
     </p:spTree>
     <p:extLst>
       <p:ext uri="{BB962C8B-B14F-4D97-AF65-F5344CB8AC3E}">
-        <p14:creationId xmlns:p14="http://schemas.microsoft.com/office/powerpoint/2010/main" val="147813387"/>
+        <p14:creationId xmlns:p14="http://schemas.microsoft.com/office/powerpoint/2010/main" val="2067100455"/>
       </p:ext>
     </p:extLst>
   </p:cSld>
@@ -1524,6 +1717,197 @@
     <p:extLst>
       <p:ext uri="{BB962C8B-B14F-4D97-AF65-F5344CB8AC3E}">
         <p14:creationId xmlns:p14="http://schemas.microsoft.com/office/powerpoint/2010/main" val="2995728640"/>
+      </p:ext>
+    </p:extLst>
+  </p:cSld>
+  <p:clrMapOvr>
+    <a:masterClrMapping/>
+  </p:clrMapOvr>
+</p:notes>
+</file>
+
+<file path=ppt/notesSlides/notesSlide20.xml><?xml version="1.0" encoding="utf-8"?>
+<p:notes xmlns:a="http://schemas.openxmlformats.org/drawingml/2006/main" xmlns:r="http://schemas.openxmlformats.org/officeDocument/2006/relationships" xmlns:p="http://schemas.openxmlformats.org/presentationml/2006/main">
+  <p:cSld>
+    <p:spTree>
+      <p:nvGrpSpPr>
+        <p:cNvPr id="1" name=""/>
+        <p:cNvGrpSpPr/>
+        <p:nvPr/>
+      </p:nvGrpSpPr>
+      <p:grpSpPr>
+        <a:xfrm>
+          <a:off x="0" y="0"/>
+          <a:ext cx="0" cy="0"/>
+          <a:chOff x="0" y="0"/>
+          <a:chExt cx="0" cy="0"/>
+        </a:xfrm>
+      </p:grpSpPr>
+      <p:sp>
+        <p:nvSpPr>
+          <p:cNvPr id="2" name="Slide Image Placeholder 1"/>
+          <p:cNvSpPr>
+            <a:spLocks noGrp="1" noRot="1" noChangeAspect="1"/>
+          </p:cNvSpPr>
+          <p:nvPr>
+            <p:ph type="sldImg"/>
+          </p:nvPr>
+        </p:nvSpPr>
+        <p:spPr/>
+      </p:sp>
+      <p:sp>
+        <p:nvSpPr>
+          <p:cNvPr id="3" name="Notes Placeholder 2"/>
+          <p:cNvSpPr>
+            <a:spLocks noGrp="1"/>
+          </p:cNvSpPr>
+          <p:nvPr>
+            <p:ph type="body" idx="1"/>
+          </p:nvPr>
+        </p:nvSpPr>
+        <p:spPr/>
+        <p:txBody>
+          <a:bodyPr/>
+          <a:lstStyle/>
+          <a:p>
+            <a:r>
+              <a:rPr lang="en-US" dirty="0" smtClean="0"/>
+              <a:t>First note references the Spanish. It’s one of the few examples we’ve found of a misreading or mistranslation</a:t>
+            </a:r>
+            <a:r>
+              <a:rPr lang="en-US" baseline="0" dirty="0" smtClean="0"/>
+              <a:t> by Southey.</a:t>
+            </a:r>
+            <a:r>
+              <a:rPr lang="en-US" dirty="0" smtClean="0"/>
+              <a:t> Second note references</a:t>
+            </a:r>
+            <a:r>
+              <a:rPr lang="en-US" baseline="0" dirty="0" smtClean="0"/>
+              <a:t> another translation. </a:t>
+            </a:r>
+            <a:endParaRPr lang="en-US" baseline="0" dirty="0" smtClean="0"/>
+          </a:p>
+          <a:p>
+            <a:r>
+              <a:rPr lang="en-US" b="1" baseline="0" dirty="0" smtClean="0"/>
+              <a:t>Pass to Elisa: go to previous slide. </a:t>
+            </a:r>
+            <a:endParaRPr lang="en-US" b="1" dirty="0"/>
+          </a:p>
+        </p:txBody>
+      </p:sp>
+      <p:sp>
+        <p:nvSpPr>
+          <p:cNvPr id="4" name="Slide Number Placeholder 3"/>
+          <p:cNvSpPr>
+            <a:spLocks noGrp="1"/>
+          </p:cNvSpPr>
+          <p:nvPr>
+            <p:ph type="sldNum" sz="quarter" idx="10"/>
+          </p:nvPr>
+        </p:nvSpPr>
+        <p:spPr/>
+        <p:txBody>
+          <a:bodyPr/>
+          <a:lstStyle/>
+          <a:p>
+            <a:fld id="{F643181A-FD5F-E940-B6DC-320B23DAA7AA}" type="slidenum">
+              <a:rPr lang="en-US" smtClean="0"/>
+              <a:t>21</a:t>
+            </a:fld>
+            <a:endParaRPr lang="en-US"/>
+          </a:p>
+        </p:txBody>
+      </p:sp>
+    </p:spTree>
+    <p:extLst>
+      <p:ext uri="{BB962C8B-B14F-4D97-AF65-F5344CB8AC3E}">
+        <p14:creationId xmlns:p14="http://schemas.microsoft.com/office/powerpoint/2010/main" val="147813387"/>
+      </p:ext>
+    </p:extLst>
+  </p:cSld>
+  <p:clrMapOvr>
+    <a:masterClrMapping/>
+  </p:clrMapOvr>
+</p:notes>
+</file>
+
+<file path=ppt/notesSlides/notesSlide21.xml><?xml version="1.0" encoding="utf-8"?>
+<p:notes xmlns:a="http://schemas.openxmlformats.org/drawingml/2006/main" xmlns:r="http://schemas.openxmlformats.org/officeDocument/2006/relationships" xmlns:p="http://schemas.openxmlformats.org/presentationml/2006/main">
+  <p:cSld>
+    <p:spTree>
+      <p:nvGrpSpPr>
+        <p:cNvPr id="1" name=""/>
+        <p:cNvGrpSpPr/>
+        <p:nvPr/>
+      </p:nvGrpSpPr>
+      <p:grpSpPr>
+        <a:xfrm>
+          <a:off x="0" y="0"/>
+          <a:ext cx="0" cy="0"/>
+          <a:chOff x="0" y="0"/>
+          <a:chExt cx="0" cy="0"/>
+        </a:xfrm>
+      </p:grpSpPr>
+      <p:sp>
+        <p:nvSpPr>
+          <p:cNvPr id="2" name="Slide Image Placeholder 1"/>
+          <p:cNvSpPr>
+            <a:spLocks noGrp="1" noRot="1" noChangeAspect="1"/>
+          </p:cNvSpPr>
+          <p:nvPr>
+            <p:ph type="sldImg"/>
+          </p:nvPr>
+        </p:nvSpPr>
+        <p:spPr/>
+      </p:sp>
+      <p:sp>
+        <p:nvSpPr>
+          <p:cNvPr id="3" name="Notes Placeholder 2"/>
+          <p:cNvSpPr>
+            <a:spLocks noGrp="1"/>
+          </p:cNvSpPr>
+          <p:nvPr>
+            <p:ph type="body" idx="1"/>
+          </p:nvPr>
+        </p:nvSpPr>
+        <p:spPr/>
+        <p:txBody>
+          <a:bodyPr/>
+          <a:lstStyle/>
+          <a:p>
+            <a:endParaRPr lang="en-US" b="1" dirty="0"/>
+          </a:p>
+        </p:txBody>
+      </p:sp>
+      <p:sp>
+        <p:nvSpPr>
+          <p:cNvPr id="4" name="Slide Number Placeholder 3"/>
+          <p:cNvSpPr>
+            <a:spLocks noGrp="1"/>
+          </p:cNvSpPr>
+          <p:nvPr>
+            <p:ph type="sldNum" sz="quarter" idx="10"/>
+          </p:nvPr>
+        </p:nvSpPr>
+        <p:spPr/>
+        <p:txBody>
+          <a:bodyPr/>
+          <a:lstStyle/>
+          <a:p>
+            <a:fld id="{F643181A-FD5F-E940-B6DC-320B23DAA7AA}" type="slidenum">
+              <a:rPr lang="en-US" smtClean="0"/>
+              <a:t>22</a:t>
+            </a:fld>
+            <a:endParaRPr lang="en-US"/>
+          </a:p>
+        </p:txBody>
+      </p:sp>
+    </p:spTree>
+    <p:extLst>
+      <p:ext uri="{BB962C8B-B14F-4D97-AF65-F5344CB8AC3E}">
+        <p14:creationId xmlns:p14="http://schemas.microsoft.com/office/powerpoint/2010/main" val="1392790114"/>
       </p:ext>
     </p:extLst>
   </p:cSld>
@@ -2264,15 +2648,35 @@
             </a:r>
             <a:r>
               <a:rPr lang="en-US" baseline="0" dirty="0" smtClean="0"/>
-              <a:t> aligned to </a:t>
+              <a:t> aligned to Montalvo with </a:t>
+            </a:r>
+            <a:r>
+              <a:rPr lang="en-US" baseline="0" dirty="0" smtClean="0"/>
+              <a:t>self-closing anchor elements. These mark with @synch alignment points with Montalvo. (We aren’t using </a:t>
             </a:r>
             <a:r>
               <a:rPr lang="en-US" baseline="0" dirty="0" err="1" smtClean="0"/>
-              <a:t>Montalvo</a:t>
+              <a:t>xml:ids</a:t>
             </a:r>
             <a:r>
               <a:rPr lang="en-US" baseline="0" dirty="0" smtClean="0"/>
-              <a:t> with anchor tags. Reveals where texts match up and do not</a:t>
+              <a:t> on Southey’s sentences, but we use this markup to “tether” </a:t>
+            </a:r>
+            <a:r>
+              <a:rPr lang="en-US" baseline="0" dirty="0" err="1" smtClean="0"/>
+              <a:t>pssages</a:t>
+            </a:r>
+            <a:r>
+              <a:rPr lang="en-US" baseline="0" dirty="0" smtClean="0"/>
+              <a:t> of the </a:t>
+            </a:r>
+            <a:r>
+              <a:rPr lang="en-US" baseline="0" dirty="0" err="1" smtClean="0"/>
+              <a:t>southye</a:t>
+            </a:r>
+            <a:r>
+              <a:rPr lang="en-US" baseline="0" dirty="0" smtClean="0"/>
+              <a:t> text with Montalvo. We find there are often multiple units per sentence, and we use the self-closing elements so that units can cross sentences boundaries.</a:t>
             </a:r>
             <a:endParaRPr lang="en-US" dirty="0"/>
           </a:p>
@@ -5780,6 +6184,14 @@
 <file path=ppt/slides/slide10.xml><?xml version="1.0" encoding="utf-8"?>
 <p:sld xmlns:a="http://schemas.openxmlformats.org/drawingml/2006/main" xmlns:r="http://schemas.openxmlformats.org/officeDocument/2006/relationships" xmlns:p="http://schemas.openxmlformats.org/presentationml/2006/main">
   <p:cSld>
+    <p:bg>
+      <p:bgPr>
+        <a:solidFill>
+          <a:schemeClr val="bg1"/>
+        </a:solidFill>
+        <a:effectLst/>
+      </p:bgPr>
+    </p:bg>
     <p:spTree>
       <p:nvGrpSpPr>
         <p:cNvPr id="1" name=""/>
@@ -5817,11 +6229,99 @@
         </p:blipFill>
         <p:spPr>
           <a:xfrm>
-            <a:off x="229508" y="699909"/>
+            <a:off x="135723" y="683587"/>
             <a:ext cx="8751923" cy="5486400"/>
           </a:xfrm>
         </p:spPr>
       </p:pic>
+      <p:sp>
+        <p:nvSpPr>
+          <p:cNvPr id="6" name="Oval 5"/>
+          <p:cNvSpPr/>
+          <p:nvPr/>
+        </p:nvSpPr>
+        <p:spPr>
+          <a:xfrm>
+            <a:off x="422031" y="699909"/>
+            <a:ext cx="4220307" cy="1175783"/>
+          </a:xfrm>
+          <a:prstGeom prst="ellipse">
+            <a:avLst/>
+          </a:prstGeom>
+          <a:noFill/>
+          <a:ln w="12700" cmpd="sng">
+            <a:solidFill>
+              <a:schemeClr val="tx2"/>
+            </a:solidFill>
+          </a:ln>
+        </p:spPr>
+        <p:style>
+          <a:lnRef idx="1">
+            <a:schemeClr val="accent1"/>
+          </a:lnRef>
+          <a:fillRef idx="3">
+            <a:schemeClr val="accent1"/>
+          </a:fillRef>
+          <a:effectRef idx="2">
+            <a:schemeClr val="accent1"/>
+          </a:effectRef>
+          <a:fontRef idx="minor">
+            <a:schemeClr val="lt1"/>
+          </a:fontRef>
+        </p:style>
+        <p:txBody>
+          <a:bodyPr rtlCol="0" anchor="ctr"/>
+          <a:lstStyle/>
+          <a:p>
+            <a:pPr algn="ctr"/>
+            <a:endParaRPr lang="en-US"/>
+          </a:p>
+        </p:txBody>
+      </p:sp>
+      <p:sp>
+        <p:nvSpPr>
+          <p:cNvPr id="7" name="Oval 6"/>
+          <p:cNvSpPr/>
+          <p:nvPr/>
+        </p:nvSpPr>
+        <p:spPr>
+          <a:xfrm>
+            <a:off x="6464487" y="763963"/>
+            <a:ext cx="2280927" cy="1205514"/>
+          </a:xfrm>
+          <a:prstGeom prst="ellipse">
+            <a:avLst/>
+          </a:prstGeom>
+          <a:noFill/>
+          <a:ln w="12700" cmpd="sng">
+            <a:solidFill>
+              <a:schemeClr val="tx2"/>
+            </a:solidFill>
+          </a:ln>
+        </p:spPr>
+        <p:style>
+          <a:lnRef idx="1">
+            <a:schemeClr val="accent1"/>
+          </a:lnRef>
+          <a:fillRef idx="3">
+            <a:schemeClr val="accent1"/>
+          </a:fillRef>
+          <a:effectRef idx="2">
+            <a:schemeClr val="accent1"/>
+          </a:effectRef>
+          <a:fontRef idx="minor">
+            <a:schemeClr val="lt1"/>
+          </a:fontRef>
+        </p:style>
+        <p:txBody>
+          <a:bodyPr rtlCol="0" anchor="ctr"/>
+          <a:lstStyle/>
+          <a:p>
+            <a:pPr algn="ctr"/>
+            <a:endParaRPr lang="en-US"/>
+          </a:p>
+        </p:txBody>
+      </p:sp>
     </p:spTree>
     <p:extLst>
       <p:ext uri="{BB962C8B-B14F-4D97-AF65-F5344CB8AC3E}">
@@ -7577,54 +8077,47 @@
           <a:chExt cx="0" cy="0"/>
         </a:xfrm>
       </p:grpSpPr>
-      <p:sp>
-        <p:nvSpPr>
-          <p:cNvPr id="2" name="Title 1"/>
-          <p:cNvSpPr>
-            <a:spLocks noGrp="1"/>
-          </p:cNvSpPr>
-          <p:nvPr>
-            <p:ph type="title"/>
-          </p:nvPr>
-        </p:nvSpPr>
-        <p:spPr/>
-        <p:txBody>
-          <a:bodyPr/>
-          <a:lstStyle/>
-          <a:p>
-            <a:endParaRPr lang="en-US"/>
-          </a:p>
-        </p:txBody>
-      </p:sp>
-      <p:sp>
-        <p:nvSpPr>
-          <p:cNvPr id="3" name="Content Placeholder 2"/>
-          <p:cNvSpPr>
-            <a:spLocks noGrp="1"/>
-          </p:cNvSpPr>
-          <p:nvPr>
-            <p:ph idx="1"/>
-          </p:nvPr>
-        </p:nvSpPr>
-        <p:spPr/>
-        <p:txBody>
-          <a:bodyPr/>
-          <a:lstStyle/>
-          <a:p>
-            <a:endParaRPr lang="en-US"/>
-          </a:p>
-        </p:txBody>
-      </p:sp>
+      <p:pic>
+        <p:nvPicPr>
+          <p:cNvPr id="3" name="Picture 2"/>
+          <p:cNvPicPr>
+            <a:picLocks noChangeAspect="1"/>
+          </p:cNvPicPr>
+          <p:nvPr/>
+        </p:nvPicPr>
+        <p:blipFill>
+          <a:blip r:embed="rId3"/>
+          <a:stretch>
+            <a:fillRect/>
+          </a:stretch>
+        </p:blipFill>
+        <p:spPr>
+          <a:xfrm>
+            <a:off x="836044" y="93785"/>
+            <a:ext cx="7675155" cy="6764215"/>
+          </a:xfrm>
+          <a:prstGeom prst="rect">
+            <a:avLst/>
+          </a:prstGeom>
+        </p:spPr>
+      </p:pic>
     </p:spTree>
     <p:extLst>
       <p:ext uri="{BB962C8B-B14F-4D97-AF65-F5344CB8AC3E}">
-        <p14:creationId xmlns:p14="http://schemas.microsoft.com/office/powerpoint/2010/main" val="1064695426"/>
+        <p14:creationId xmlns:p14="http://schemas.microsoft.com/office/powerpoint/2010/main" val="278376820"/>
       </p:ext>
     </p:extLst>
   </p:cSld>
   <p:clrMapOvr>
     <a:masterClrMapping/>
   </p:clrMapOvr>
+  <p:timing>
+    <p:tnLst>
+      <p:par>
+        <p:cTn id="1" dur="indefinite" restart="never" nodeType="tmRoot"/>
+      </p:par>
+    </p:tnLst>
+  </p:timing>
 </p:sld>
 </file>
 
@@ -7645,32 +8138,38 @@
           <a:chExt cx="0" cy="0"/>
         </a:xfrm>
       </p:grpSpPr>
-      <p:sp>
-        <p:nvSpPr>
-          <p:cNvPr id="2" name="Content Placeholder 1"/>
-          <p:cNvSpPr>
-            <a:spLocks noGrp="1"/>
-          </p:cNvSpPr>
+      <p:pic>
+        <p:nvPicPr>
+          <p:cNvPr id="3" name="Content Placeholder 2" descr="Screen Shot 2015-10-30 at 4.57.16 PM.png"/>
+          <p:cNvPicPr>
+            <a:picLocks noGrp="1" noChangeAspect="1"/>
+          </p:cNvPicPr>
           <p:nvPr>
             <p:ph idx="1"/>
           </p:nvPr>
-        </p:nvSpPr>
-        <p:spPr/>
-        <p:txBody>
-          <a:bodyPr/>
-          <a:lstStyle/>
-          <a:p>
-            <a:r>
-              <a:rPr lang="en-US" dirty="0" smtClean="0"/>
-              <a:t>TOC</a:t>
-            </a:r>
-          </a:p>
-        </p:txBody>
-      </p:sp>
+        </p:nvPicPr>
+        <p:blipFill rotWithShape="1">
+          <a:blip r:embed="rId3">
+            <a:extLst>
+              <a:ext uri="{28A0092B-C50C-407E-A947-70E740481C1C}">
+                <a14:useLocalDpi xmlns:a14="http://schemas.microsoft.com/office/drawing/2010/main" val="0"/>
+              </a:ext>
+            </a:extLst>
+          </a:blip>
+          <a:srcRect l="-12622" r="5459"/>
+          <a:stretch/>
+        </p:blipFill>
+        <p:spPr>
+          <a:xfrm>
+            <a:off x="133117" y="611980"/>
+            <a:ext cx="8565406" cy="5932142"/>
+          </a:xfrm>
+        </p:spPr>
+      </p:pic>
     </p:spTree>
     <p:extLst>
       <p:ext uri="{BB962C8B-B14F-4D97-AF65-F5344CB8AC3E}">
-        <p14:creationId xmlns:p14="http://schemas.microsoft.com/office/powerpoint/2010/main" val="278376820"/>
+        <p14:creationId xmlns:p14="http://schemas.microsoft.com/office/powerpoint/2010/main" val="1902750996"/>
       </p:ext>
     </p:extLst>
   </p:cSld>
@@ -7704,38 +8203,847 @@
           <a:chExt cx="0" cy="0"/>
         </a:xfrm>
       </p:grpSpPr>
-      <p:pic>
-        <p:nvPicPr>
-          <p:cNvPr id="3" name="Content Placeholder 2" descr="Screen Shot 2015-10-30 at 4.57.16 PM.png"/>
-          <p:cNvPicPr>
-            <a:picLocks noGrp="1" noChangeAspect="1"/>
-          </p:cNvPicPr>
+      <p:sp>
+        <p:nvSpPr>
+          <p:cNvPr id="2" name="Content Placeholder 1"/>
+          <p:cNvSpPr>
+            <a:spLocks noGrp="1"/>
+          </p:cNvSpPr>
           <p:nvPr>
             <p:ph idx="1"/>
           </p:nvPr>
-        </p:nvPicPr>
-        <p:blipFill rotWithShape="1">
-          <a:blip r:embed="rId3">
-            <a:extLst>
-              <a:ext uri="{28A0092B-C50C-407E-A947-70E740481C1C}">
-                <a14:useLocalDpi xmlns:a14="http://schemas.microsoft.com/office/drawing/2010/main" val="0"/>
-              </a:ext>
-            </a:extLst>
-          </a:blip>
-          <a:srcRect l="-12622" r="5459"/>
-          <a:stretch/>
-        </p:blipFill>
+        </p:nvSpPr>
         <p:spPr>
           <a:xfrm>
-            <a:off x="133117" y="611980"/>
-            <a:ext cx="8725910" cy="6043302"/>
+            <a:off x="164124" y="2286000"/>
+            <a:ext cx="8604738" cy="4425461"/>
           </a:xfrm>
         </p:spPr>
-      </p:pic>
+        <p:txBody>
+          <a:bodyPr>
+            <a:normAutofit lnSpcReduction="10000"/>
+          </a:bodyPr>
+          <a:lstStyle/>
+          <a:p>
+            <a:pPr marL="0" indent="0">
+              <a:buNone/>
+            </a:pPr>
+            <a:r>
+              <a:rPr lang="en-US" dirty="0" smtClean="0">
+                <a:solidFill>
+                  <a:srgbClr val="005AB4"/>
+                </a:solidFill>
+              </a:rPr>
+              <a:t>&lt;</a:t>
+            </a:r>
+            <a:r>
+              <a:rPr lang="en-US" dirty="0" err="1">
+                <a:solidFill>
+                  <a:srgbClr val="005AB4"/>
+                </a:solidFill>
+              </a:rPr>
+              <a:t>xsl:element</a:t>
+            </a:r>
+            <a:r>
+              <a:rPr lang="en-US" dirty="0">
+                <a:solidFill>
+                  <a:srgbClr val="F5844C"/>
+                </a:solidFill>
+              </a:rPr>
+              <a:t> name</a:t>
+            </a:r>
+            <a:r>
+              <a:rPr lang="en-US" dirty="0">
+                <a:solidFill>
+                  <a:srgbClr val="FF8040"/>
+                </a:solidFill>
+              </a:rPr>
+              <a:t>=</a:t>
+            </a:r>
+            <a:r>
+              <a:rPr lang="en-US" dirty="0">
+                <a:solidFill>
+                  <a:srgbClr val="993300"/>
+                </a:solidFill>
+              </a:rPr>
+              <a:t>"f"</a:t>
+            </a:r>
+            <a:r>
+              <a:rPr lang="en-US" dirty="0">
+                <a:solidFill>
+                  <a:srgbClr val="000096"/>
+                </a:solidFill>
+              </a:rPr>
+              <a:t>&gt;</a:t>
+            </a:r>
+            <a:r>
+              <a:rPr lang="en-US" dirty="0">
+                <a:solidFill>
+                  <a:srgbClr val="000000"/>
+                </a:solidFill>
+              </a:rPr>
+              <a:t/>
+            </a:r>
+            <a:br>
+              <a:rPr lang="en-US" dirty="0">
+                <a:solidFill>
+                  <a:srgbClr val="000000"/>
+                </a:solidFill>
+              </a:rPr>
+            </a:br>
+            <a:r>
+              <a:rPr lang="en-US" dirty="0">
+                <a:solidFill>
+                  <a:srgbClr val="000000"/>
+                </a:solidFill>
+              </a:rPr>
+              <a:t>                </a:t>
+            </a:r>
+            <a:r>
+              <a:rPr lang="en-US" dirty="0">
+                <a:solidFill>
+                  <a:srgbClr val="005AB4"/>
+                </a:solidFill>
+              </a:rPr>
+              <a:t>&lt;</a:t>
+            </a:r>
+            <a:r>
+              <a:rPr lang="en-US" dirty="0" err="1">
+                <a:solidFill>
+                  <a:srgbClr val="005AB4"/>
+                </a:solidFill>
+              </a:rPr>
+              <a:t>xsl:attribute</a:t>
+            </a:r>
+            <a:r>
+              <a:rPr lang="en-US" dirty="0">
+                <a:solidFill>
+                  <a:srgbClr val="F5844C"/>
+                </a:solidFill>
+              </a:rPr>
+              <a:t> name</a:t>
+            </a:r>
+            <a:r>
+              <a:rPr lang="en-US" dirty="0">
+                <a:solidFill>
+                  <a:srgbClr val="FF8040"/>
+                </a:solidFill>
+              </a:rPr>
+              <a:t>=</a:t>
+            </a:r>
+            <a:r>
+              <a:rPr lang="en-US" dirty="0">
+                <a:solidFill>
+                  <a:srgbClr val="993300"/>
+                </a:solidFill>
+              </a:rPr>
+              <a:t>"name"</a:t>
+            </a:r>
+            <a:r>
+              <a:rPr lang="en-US" dirty="0">
+                <a:solidFill>
+                  <a:srgbClr val="000096"/>
+                </a:solidFill>
+              </a:rPr>
+              <a:t>&gt;</a:t>
+            </a:r>
+            <a:r>
+              <a:rPr lang="en-US" dirty="0" err="1">
+                <a:solidFill>
+                  <a:srgbClr val="000000"/>
+                </a:solidFill>
+              </a:rPr>
+              <a:t>southey</a:t>
+            </a:r>
+            <a:r>
+              <a:rPr lang="en-US" dirty="0">
+                <a:solidFill>
+                  <a:srgbClr val="005AB4"/>
+                </a:solidFill>
+              </a:rPr>
+              <a:t>&lt;/</a:t>
+            </a:r>
+            <a:r>
+              <a:rPr lang="en-US" dirty="0" err="1">
+                <a:solidFill>
+                  <a:srgbClr val="005AB4"/>
+                </a:solidFill>
+              </a:rPr>
+              <a:t>xsl:attribute</a:t>
+            </a:r>
+            <a:r>
+              <a:rPr lang="en-US" dirty="0">
+                <a:solidFill>
+                  <a:srgbClr val="005AB4"/>
+                </a:solidFill>
+              </a:rPr>
+              <a:t>&gt;</a:t>
+            </a:r>
+            <a:r>
+              <a:rPr lang="en-US" dirty="0">
+                <a:solidFill>
+                  <a:srgbClr val="000000"/>
+                </a:solidFill>
+              </a:rPr>
+              <a:t/>
+            </a:r>
+            <a:br>
+              <a:rPr lang="en-US" dirty="0">
+                <a:solidFill>
+                  <a:srgbClr val="000000"/>
+                </a:solidFill>
+              </a:rPr>
+            </a:br>
+            <a:r>
+              <a:rPr lang="en-US" dirty="0">
+                <a:solidFill>
+                  <a:srgbClr val="000000"/>
+                </a:solidFill>
+              </a:rPr>
+              <a:t>                </a:t>
+            </a:r>
+            <a:r>
+              <a:rPr lang="en-US" dirty="0">
+                <a:solidFill>
+                  <a:srgbClr val="005AB4"/>
+                </a:solidFill>
+              </a:rPr>
+              <a:t>&lt;</a:t>
+            </a:r>
+            <a:r>
+              <a:rPr lang="en-US" dirty="0" err="1">
+                <a:solidFill>
+                  <a:srgbClr val="005AB4"/>
+                </a:solidFill>
+              </a:rPr>
+              <a:t>xsl:attribute</a:t>
+            </a:r>
+            <a:r>
+              <a:rPr lang="en-US" dirty="0">
+                <a:solidFill>
+                  <a:srgbClr val="F5844C"/>
+                </a:solidFill>
+              </a:rPr>
+              <a:t> name</a:t>
+            </a:r>
+            <a:r>
+              <a:rPr lang="en-US" dirty="0">
+                <a:solidFill>
+                  <a:srgbClr val="FF8040"/>
+                </a:solidFill>
+              </a:rPr>
+              <a:t>=</a:t>
+            </a:r>
+            <a:r>
+              <a:rPr lang="en-US" dirty="0">
+                <a:solidFill>
+                  <a:srgbClr val="993300"/>
+                </a:solidFill>
+              </a:rPr>
+              <a:t>"n"</a:t>
+            </a:r>
+            <a:r>
+              <a:rPr lang="en-US" dirty="0">
+                <a:solidFill>
+                  <a:srgbClr val="000096"/>
+                </a:solidFill>
+              </a:rPr>
+              <a:t>&gt;</a:t>
+            </a:r>
+            <a:r>
+              <a:rPr lang="en-US" dirty="0">
+                <a:solidFill>
+                  <a:srgbClr val="000000"/>
+                </a:solidFill>
+              </a:rPr>
+              <a:t/>
+            </a:r>
+            <a:br>
+              <a:rPr lang="en-US" dirty="0">
+                <a:solidFill>
+                  <a:srgbClr val="000000"/>
+                </a:solidFill>
+              </a:rPr>
+            </a:br>
+            <a:r>
+              <a:rPr lang="en-US" dirty="0">
+                <a:solidFill>
+                  <a:srgbClr val="000000"/>
+                </a:solidFill>
+              </a:rPr>
+              <a:t>                    </a:t>
+            </a:r>
+            <a:r>
+              <a:rPr lang="en-US" dirty="0">
+                <a:solidFill>
+                  <a:srgbClr val="005AB4"/>
+                </a:solidFill>
+              </a:rPr>
+              <a:t>&lt;</a:t>
+            </a:r>
+            <a:r>
+              <a:rPr lang="en-US" dirty="0" err="1">
+                <a:solidFill>
+                  <a:srgbClr val="005AB4"/>
+                </a:solidFill>
+              </a:rPr>
+              <a:t>xsl:value-of</a:t>
+            </a:r>
+            <a:r>
+              <a:rPr lang="en-US" dirty="0">
+                <a:solidFill>
+                  <a:srgbClr val="F5844C"/>
+                </a:solidFill>
+              </a:rPr>
+              <a:t> select</a:t>
+            </a:r>
+            <a:r>
+              <a:rPr lang="en-US" dirty="0">
+                <a:solidFill>
+                  <a:srgbClr val="FF8040"/>
+                </a:solidFill>
+              </a:rPr>
+              <a:t>=</a:t>
+            </a:r>
+            <a:r>
+              <a:rPr lang="en-US" dirty="0">
+                <a:solidFill>
+                  <a:srgbClr val="993300"/>
+                </a:solidFill>
+              </a:rPr>
+              <a:t>"$</a:t>
+            </a:r>
+            <a:r>
+              <a:rPr lang="en-US" dirty="0" err="1">
+                <a:solidFill>
+                  <a:srgbClr val="993300"/>
+                </a:solidFill>
+              </a:rPr>
+              <a:t>southey</a:t>
+            </a:r>
+            <a:r>
+              <a:rPr lang="en-US" dirty="0">
+                <a:solidFill>
+                  <a:srgbClr val="993300"/>
+                </a:solidFill>
+              </a:rPr>
+              <a:t>-words"</a:t>
+            </a:r>
+            <a:r>
+              <a:rPr lang="en-US" dirty="0">
+                <a:solidFill>
+                  <a:srgbClr val="000096"/>
+                </a:solidFill>
+              </a:rPr>
+              <a:t>/&gt;</a:t>
+            </a:r>
+            <a:r>
+              <a:rPr lang="en-US" dirty="0">
+                <a:solidFill>
+                  <a:srgbClr val="000000"/>
+                </a:solidFill>
+              </a:rPr>
+              <a:t/>
+            </a:r>
+            <a:br>
+              <a:rPr lang="en-US" dirty="0">
+                <a:solidFill>
+                  <a:srgbClr val="000000"/>
+                </a:solidFill>
+              </a:rPr>
+            </a:br>
+            <a:r>
+              <a:rPr lang="en-US" dirty="0">
+                <a:solidFill>
+                  <a:srgbClr val="000000"/>
+                </a:solidFill>
+              </a:rPr>
+              <a:t>                </a:t>
+            </a:r>
+            <a:r>
+              <a:rPr lang="en-US" dirty="0">
+                <a:solidFill>
+                  <a:srgbClr val="005AB4"/>
+                </a:solidFill>
+              </a:rPr>
+              <a:t>&lt;/</a:t>
+            </a:r>
+            <a:r>
+              <a:rPr lang="en-US" dirty="0" err="1">
+                <a:solidFill>
+                  <a:srgbClr val="005AB4"/>
+                </a:solidFill>
+              </a:rPr>
+              <a:t>xsl:attribute</a:t>
+            </a:r>
+            <a:r>
+              <a:rPr lang="en-US" dirty="0">
+                <a:solidFill>
+                  <a:srgbClr val="005AB4"/>
+                </a:solidFill>
+              </a:rPr>
+              <a:t>&gt;</a:t>
+            </a:r>
+            <a:r>
+              <a:rPr lang="en-US" dirty="0">
+                <a:solidFill>
+                  <a:srgbClr val="000000"/>
+                </a:solidFill>
+              </a:rPr>
+              <a:t/>
+            </a:r>
+            <a:br>
+              <a:rPr lang="en-US" dirty="0">
+                <a:solidFill>
+                  <a:srgbClr val="000000"/>
+                </a:solidFill>
+              </a:rPr>
+            </a:br>
+            <a:r>
+              <a:rPr lang="en-US" dirty="0">
+                <a:solidFill>
+                  <a:srgbClr val="000000"/>
+                </a:solidFill>
+              </a:rPr>
+              <a:t>                </a:t>
+            </a:r>
+            <a:r>
+              <a:rPr lang="en-US" dirty="0">
+                <a:solidFill>
+                  <a:srgbClr val="005AB4"/>
+                </a:solidFill>
+              </a:rPr>
+              <a:t>&lt;</a:t>
+            </a:r>
+            <a:r>
+              <a:rPr lang="en-US" dirty="0" err="1">
+                <a:solidFill>
+                  <a:srgbClr val="005AB4"/>
+                </a:solidFill>
+              </a:rPr>
+              <a:t>xsl:if</a:t>
+            </a:r>
+            <a:r>
+              <a:rPr lang="en-US" dirty="0">
+                <a:solidFill>
+                  <a:srgbClr val="F5844C"/>
+                </a:solidFill>
+              </a:rPr>
+              <a:t> test</a:t>
+            </a:r>
+            <a:r>
+              <a:rPr lang="en-US" dirty="0">
+                <a:solidFill>
+                  <a:srgbClr val="FF8040"/>
+                </a:solidFill>
+              </a:rPr>
+              <a:t>=</a:t>
+            </a:r>
+            <a:r>
+              <a:rPr lang="en-US" dirty="0">
+                <a:solidFill>
+                  <a:srgbClr val="993300"/>
+                </a:solidFill>
+              </a:rPr>
+              <a:t>"@synch"</a:t>
+            </a:r>
+            <a:r>
+              <a:rPr lang="en-US" dirty="0">
+                <a:solidFill>
+                  <a:srgbClr val="000096"/>
+                </a:solidFill>
+              </a:rPr>
+              <a:t>&gt;</a:t>
+            </a:r>
+            <a:r>
+              <a:rPr lang="en-US" dirty="0">
+                <a:solidFill>
+                  <a:srgbClr val="000000"/>
+                </a:solidFill>
+              </a:rPr>
+              <a:t/>
+            </a:r>
+            <a:br>
+              <a:rPr lang="en-US" dirty="0">
+                <a:solidFill>
+                  <a:srgbClr val="000000"/>
+                </a:solidFill>
+              </a:rPr>
+            </a:br>
+            <a:r>
+              <a:rPr lang="en-US" dirty="0">
+                <a:solidFill>
+                  <a:srgbClr val="000000"/>
+                </a:solidFill>
+              </a:rPr>
+              <a:t>                    </a:t>
+            </a:r>
+            <a:r>
+              <a:rPr lang="en-US" dirty="0">
+                <a:solidFill>
+                  <a:srgbClr val="005AB4"/>
+                </a:solidFill>
+              </a:rPr>
+              <a:t>&lt;</a:t>
+            </a:r>
+            <a:r>
+              <a:rPr lang="en-US" dirty="0" err="1">
+                <a:solidFill>
+                  <a:srgbClr val="005AB4"/>
+                </a:solidFill>
+              </a:rPr>
+              <a:t>xsl:attribute</a:t>
+            </a:r>
+            <a:r>
+              <a:rPr lang="en-US" dirty="0">
+                <a:solidFill>
+                  <a:srgbClr val="F5844C"/>
+                </a:solidFill>
+              </a:rPr>
+              <a:t> name</a:t>
+            </a:r>
+            <a:r>
+              <a:rPr lang="en-US" dirty="0">
+                <a:solidFill>
+                  <a:srgbClr val="FF8040"/>
+                </a:solidFill>
+              </a:rPr>
+              <a:t>=</a:t>
+            </a:r>
+            <a:r>
+              <a:rPr lang="en-US" dirty="0">
+                <a:solidFill>
+                  <a:srgbClr val="993300"/>
+                </a:solidFill>
+              </a:rPr>
+              <a:t>"</a:t>
+            </a:r>
+            <a:r>
+              <a:rPr lang="en-US" dirty="0" err="1">
+                <a:solidFill>
+                  <a:srgbClr val="993300"/>
+                </a:solidFill>
+              </a:rPr>
+              <a:t>ana</a:t>
+            </a:r>
+            <a:r>
+              <a:rPr lang="en-US" dirty="0">
+                <a:solidFill>
+                  <a:srgbClr val="993300"/>
+                </a:solidFill>
+              </a:rPr>
+              <a:t>"</a:t>
+            </a:r>
+            <a:r>
+              <a:rPr lang="en-US" dirty="0">
+                <a:solidFill>
+                  <a:srgbClr val="000096"/>
+                </a:solidFill>
+              </a:rPr>
+              <a:t>&gt;</a:t>
+            </a:r>
+            <a:r>
+              <a:rPr lang="en-US" dirty="0">
+                <a:solidFill>
+                  <a:srgbClr val="005AB4"/>
+                </a:solidFill>
+              </a:rPr>
+              <a:t>&lt;</a:t>
+            </a:r>
+            <a:r>
+              <a:rPr lang="en-US" dirty="0" err="1">
+                <a:solidFill>
+                  <a:srgbClr val="005AB4"/>
+                </a:solidFill>
+              </a:rPr>
+              <a:t>xsl:value-of</a:t>
+            </a:r>
+            <a:r>
+              <a:rPr lang="en-US" dirty="0">
+                <a:solidFill>
+                  <a:srgbClr val="000000"/>
+                </a:solidFill>
+              </a:rPr>
+              <a:t/>
+            </a:r>
+            <a:br>
+              <a:rPr lang="en-US" dirty="0">
+                <a:solidFill>
+                  <a:srgbClr val="000000"/>
+                </a:solidFill>
+              </a:rPr>
+            </a:br>
+            <a:r>
+              <a:rPr lang="en-US" dirty="0">
+                <a:solidFill>
+                  <a:srgbClr val="F5844C"/>
+                </a:solidFill>
+              </a:rPr>
+              <a:t>                        select</a:t>
+            </a:r>
+            <a:r>
+              <a:rPr lang="en-US" dirty="0">
+                <a:solidFill>
+                  <a:srgbClr val="FF8040"/>
+                </a:solidFill>
+              </a:rPr>
+              <a:t>=</a:t>
+            </a:r>
+            <a:r>
+              <a:rPr lang="en-US" dirty="0">
+                <a:solidFill>
+                  <a:srgbClr val="993300"/>
+                </a:solidFill>
+              </a:rPr>
+              <a:t>"round-half-to-even(($</a:t>
+            </a:r>
+            <a:r>
+              <a:rPr lang="en-US" dirty="0" err="1">
+                <a:solidFill>
+                  <a:srgbClr val="993300"/>
+                </a:solidFill>
+              </a:rPr>
+              <a:t>montalvo</a:t>
+            </a:r>
+            <a:r>
+              <a:rPr lang="en-US" dirty="0">
+                <a:solidFill>
+                  <a:srgbClr val="993300"/>
+                </a:solidFill>
+              </a:rPr>
+              <a:t>-words - $</a:t>
+            </a:r>
+            <a:r>
+              <a:rPr lang="en-US" dirty="0" err="1">
+                <a:solidFill>
+                  <a:srgbClr val="993300"/>
+                </a:solidFill>
+              </a:rPr>
+              <a:t>southey</a:t>
+            </a:r>
+            <a:r>
+              <a:rPr lang="en-US" dirty="0">
+                <a:solidFill>
+                  <a:srgbClr val="993300"/>
+                </a:solidFill>
+              </a:rPr>
+              <a:t>-words) div $</a:t>
+            </a:r>
+            <a:r>
+              <a:rPr lang="en-US" dirty="0" err="1">
+                <a:solidFill>
+                  <a:srgbClr val="993300"/>
+                </a:solidFill>
+              </a:rPr>
+              <a:t>southey</a:t>
+            </a:r>
+            <a:r>
+              <a:rPr lang="en-US" dirty="0">
+                <a:solidFill>
+                  <a:srgbClr val="993300"/>
+                </a:solidFill>
+              </a:rPr>
+              <a:t>-words, 2)"</a:t>
+            </a:r>
+            <a:r>
+              <a:rPr lang="en-US" dirty="0">
+                <a:solidFill>
+                  <a:srgbClr val="000000"/>
+                </a:solidFill>
+              </a:rPr>
+              <a:t/>
+            </a:r>
+            <a:br>
+              <a:rPr lang="en-US" dirty="0">
+                <a:solidFill>
+                  <a:srgbClr val="000000"/>
+                </a:solidFill>
+              </a:rPr>
+            </a:br>
+            <a:r>
+              <a:rPr lang="en-US" dirty="0">
+                <a:solidFill>
+                  <a:srgbClr val="F5844C"/>
+                </a:solidFill>
+              </a:rPr>
+              <a:t>                    </a:t>
+            </a:r>
+            <a:r>
+              <a:rPr lang="en-US" dirty="0">
+                <a:solidFill>
+                  <a:srgbClr val="000096"/>
+                </a:solidFill>
+              </a:rPr>
+              <a:t>/&gt;</a:t>
+            </a:r>
+            <a:r>
+              <a:rPr lang="en-US" dirty="0">
+                <a:solidFill>
+                  <a:srgbClr val="000000"/>
+                </a:solidFill>
+              </a:rPr>
+              <a:t/>
+            </a:r>
+            <a:br>
+              <a:rPr lang="en-US" dirty="0">
+                <a:solidFill>
+                  <a:srgbClr val="000000"/>
+                </a:solidFill>
+              </a:rPr>
+            </a:br>
+            <a:r>
+              <a:rPr lang="en-US" dirty="0">
+                <a:solidFill>
+                  <a:srgbClr val="000000"/>
+                </a:solidFill>
+              </a:rPr>
+              <a:t>                    </a:t>
+            </a:r>
+            <a:r>
+              <a:rPr lang="en-US" dirty="0">
+                <a:solidFill>
+                  <a:srgbClr val="005AB4"/>
+                </a:solidFill>
+              </a:rPr>
+              <a:t>&lt;/</a:t>
+            </a:r>
+            <a:r>
+              <a:rPr lang="en-US" dirty="0" err="1">
+                <a:solidFill>
+                  <a:srgbClr val="005AB4"/>
+                </a:solidFill>
+              </a:rPr>
+              <a:t>xsl:attribute</a:t>
+            </a:r>
+            <a:r>
+              <a:rPr lang="en-US" dirty="0">
+                <a:solidFill>
+                  <a:srgbClr val="005AB4"/>
+                </a:solidFill>
+              </a:rPr>
+              <a:t>&gt;</a:t>
+            </a:r>
+            <a:r>
+              <a:rPr lang="en-US" dirty="0">
+                <a:solidFill>
+                  <a:srgbClr val="000000"/>
+                </a:solidFill>
+              </a:rPr>
+              <a:t/>
+            </a:r>
+            <a:br>
+              <a:rPr lang="en-US" dirty="0">
+                <a:solidFill>
+                  <a:srgbClr val="000000"/>
+                </a:solidFill>
+              </a:rPr>
+            </a:br>
+            <a:r>
+              <a:rPr lang="en-US" dirty="0">
+                <a:solidFill>
+                  <a:srgbClr val="000000"/>
+                </a:solidFill>
+              </a:rPr>
+              <a:t>                </a:t>
+            </a:r>
+            <a:r>
+              <a:rPr lang="en-US" dirty="0">
+                <a:solidFill>
+                  <a:srgbClr val="005AB4"/>
+                </a:solidFill>
+              </a:rPr>
+              <a:t>&lt;/</a:t>
+            </a:r>
+            <a:r>
+              <a:rPr lang="en-US" dirty="0" err="1">
+                <a:solidFill>
+                  <a:srgbClr val="005AB4"/>
+                </a:solidFill>
+              </a:rPr>
+              <a:t>xsl:if</a:t>
+            </a:r>
+            <a:r>
+              <a:rPr lang="en-US" dirty="0">
+                <a:solidFill>
+                  <a:srgbClr val="005AB4"/>
+                </a:solidFill>
+              </a:rPr>
+              <a:t>&gt;</a:t>
+            </a:r>
+            <a:endParaRPr lang="en-US" dirty="0"/>
+          </a:p>
+        </p:txBody>
+      </p:sp>
+      <p:sp>
+        <p:nvSpPr>
+          <p:cNvPr id="4" name="TextBox 3"/>
+          <p:cNvSpPr txBox="1"/>
+          <p:nvPr/>
+        </p:nvSpPr>
+        <p:spPr>
+          <a:xfrm>
+            <a:off x="164123" y="457200"/>
+            <a:ext cx="8604739" cy="1477328"/>
+          </a:xfrm>
+          <a:prstGeom prst="rect">
+            <a:avLst/>
+          </a:prstGeom>
+          <a:noFill/>
+        </p:spPr>
+        <p:txBody>
+          <a:bodyPr wrap="square" rtlCol="0">
+            <a:spAutoFit/>
+          </a:bodyPr>
+          <a:lstStyle/>
+          <a:p>
+            <a:r>
+              <a:rPr lang="en-US" b="1" dirty="0" smtClean="0"/>
+              <a:t>A snippet of XSLT: Constructing the &lt;f</a:t>
+            </a:r>
+            <a:r>
+              <a:rPr lang="en-US" b="1" dirty="0"/>
+              <a:t>&gt;</a:t>
+            </a:r>
+            <a:r>
+              <a:rPr lang="en-US" b="1" dirty="0" smtClean="0"/>
+              <a:t> element for Southey in a given &lt;fs&gt;</a:t>
+            </a:r>
+          </a:p>
+          <a:p>
+            <a:pPr marL="285750" indent="-285750">
+              <a:buFont typeface="Arial" panose="020B0604020202020204" pitchFamily="34" charset="0"/>
+              <a:buChar char="•"/>
+            </a:pPr>
+            <a:r>
+              <a:rPr lang="en-US" dirty="0" smtClean="0"/>
+              <a:t>If an @synch attribute is present on an &lt;anchor&gt;, the passage is linked to Montalvo. </a:t>
+            </a:r>
+          </a:p>
+          <a:p>
+            <a:pPr marL="285750" indent="-285750">
+              <a:buFont typeface="Arial" panose="020B0604020202020204" pitchFamily="34" charset="0"/>
+              <a:buChar char="•"/>
+            </a:pPr>
+            <a:r>
+              <a:rPr lang="en-US" dirty="0" smtClean="0"/>
+              <a:t>@</a:t>
+            </a:r>
+            <a:r>
+              <a:rPr lang="en-US" dirty="0" err="1" smtClean="0"/>
+              <a:t>ana</a:t>
+            </a:r>
+            <a:r>
+              <a:rPr lang="en-US" dirty="0" smtClean="0"/>
+              <a:t> is a calculation of the proportion by which Montalvo’s word count differs from Southey’s</a:t>
+            </a:r>
+            <a:endParaRPr lang="en-US" dirty="0"/>
+          </a:p>
+        </p:txBody>
+      </p:sp>
     </p:spTree>
     <p:extLst>
       <p:ext uri="{BB962C8B-B14F-4D97-AF65-F5344CB8AC3E}">
-        <p14:creationId xmlns:p14="http://schemas.microsoft.com/office/powerpoint/2010/main" val="1902750996"/>
+        <p14:creationId xmlns:p14="http://schemas.microsoft.com/office/powerpoint/2010/main" val="2710045223"/>
       </p:ext>
     </p:extLst>
   </p:cSld>
@@ -7794,8 +9102,8 @@
         </p:blipFill>
         <p:spPr>
           <a:xfrm>
-            <a:off x="457200" y="1125916"/>
-            <a:ext cx="8229600" cy="4876800"/>
+            <a:off x="199179" y="973015"/>
+            <a:ext cx="8724167" cy="5169877"/>
           </a:xfrm>
         </p:spPr>
       </p:pic>
@@ -7977,8 +9285,8 @@
         </p:blipFill>
         <p:spPr>
           <a:xfrm>
-            <a:off x="457200" y="972921"/>
-            <a:ext cx="8229600" cy="4876800"/>
+            <a:off x="175845" y="806192"/>
+            <a:ext cx="8804031" cy="5217203"/>
           </a:xfrm>
         </p:spPr>
       </p:pic>
@@ -8044,8 +9352,8 @@
         </p:blipFill>
         <p:spPr>
           <a:xfrm>
-            <a:off x="284972" y="774027"/>
-            <a:ext cx="8522415" cy="5050320"/>
+            <a:off x="67362" y="527538"/>
+            <a:ext cx="8938365" cy="5296809"/>
           </a:xfrm>
         </p:spPr>
       </p:pic>
@@ -8155,6 +9463,69 @@
       </p:grpSpPr>
       <p:pic>
         <p:nvPicPr>
+          <p:cNvPr id="4" name="Content Placeholder 3"/>
+          <p:cNvPicPr>
+            <a:picLocks noGrp="1" noChangeAspect="1"/>
+          </p:cNvPicPr>
+          <p:nvPr>
+            <p:ph idx="1"/>
+          </p:nvPr>
+        </p:nvPicPr>
+        <p:blipFill>
+          <a:blip r:embed="rId3"/>
+          <a:stretch>
+            <a:fillRect/>
+          </a:stretch>
+        </p:blipFill>
+        <p:spPr>
+          <a:xfrm>
+            <a:off x="1922585" y="51163"/>
+            <a:ext cx="4443046" cy="6686897"/>
+          </a:xfrm>
+          <a:prstGeom prst="rect">
+            <a:avLst/>
+          </a:prstGeom>
+        </p:spPr>
+      </p:pic>
+    </p:spTree>
+    <p:extLst>
+      <p:ext uri="{BB962C8B-B14F-4D97-AF65-F5344CB8AC3E}">
+        <p14:creationId xmlns:p14="http://schemas.microsoft.com/office/powerpoint/2010/main" val="1418943292"/>
+      </p:ext>
+    </p:extLst>
+  </p:cSld>
+  <p:clrMapOvr>
+    <a:masterClrMapping/>
+  </p:clrMapOvr>
+  <p:timing>
+    <p:tnLst>
+      <p:par>
+        <p:cTn id="1" dur="indefinite" restart="never" nodeType="tmRoot"/>
+      </p:par>
+    </p:tnLst>
+  </p:timing>
+</p:sld>
+</file>
+
+<file path=ppt/slides/slide21.xml><?xml version="1.0" encoding="utf-8"?>
+<p:sld xmlns:a="http://schemas.openxmlformats.org/drawingml/2006/main" xmlns:r="http://schemas.openxmlformats.org/officeDocument/2006/relationships" xmlns:p="http://schemas.openxmlformats.org/presentationml/2006/main">
+  <p:cSld>
+    <p:spTree>
+      <p:nvGrpSpPr>
+        <p:cNvPr id="1" name=""/>
+        <p:cNvGrpSpPr/>
+        <p:nvPr/>
+      </p:nvGrpSpPr>
+      <p:grpSpPr>
+        <a:xfrm>
+          <a:off x="0" y="0"/>
+          <a:ext cx="0" cy="0"/>
+          <a:chOff x="0" y="0"/>
+          <a:chExt cx="0" cy="0"/>
+        </a:xfrm>
+      </p:grpSpPr>
+      <p:pic>
+        <p:nvPicPr>
           <p:cNvPr id="3" name="Content Placeholder 2" descr="Screen Shot 2015-10-29 at 2.41.01 PM.png"/>
           <p:cNvPicPr>
             <a:picLocks noGrp="1" noChangeAspect="1"/>
@@ -8217,6 +9588,163 @@
     <p:extLst>
       <p:ext uri="{BB962C8B-B14F-4D97-AF65-F5344CB8AC3E}">
         <p14:creationId xmlns:p14="http://schemas.microsoft.com/office/powerpoint/2010/main" val="1178725661"/>
+      </p:ext>
+    </p:extLst>
+  </p:cSld>
+  <p:clrMapOvr>
+    <a:masterClrMapping/>
+  </p:clrMapOvr>
+  <p:timing>
+    <p:tnLst>
+      <p:par>
+        <p:cTn id="1" dur="indefinite" restart="never" nodeType="tmRoot"/>
+      </p:par>
+    </p:tnLst>
+  </p:timing>
+</p:sld>
+</file>
+
+<file path=ppt/slides/slide22.xml><?xml version="1.0" encoding="utf-8"?>
+<p:sld xmlns:a="http://schemas.openxmlformats.org/drawingml/2006/main" xmlns:r="http://schemas.openxmlformats.org/officeDocument/2006/relationships" xmlns:p="http://schemas.openxmlformats.org/presentationml/2006/main">
+  <p:cSld>
+    <p:spTree>
+      <p:nvGrpSpPr>
+        <p:cNvPr id="1" name=""/>
+        <p:cNvGrpSpPr/>
+        <p:nvPr/>
+      </p:nvGrpSpPr>
+      <p:grpSpPr>
+        <a:xfrm>
+          <a:off x="0" y="0"/>
+          <a:ext cx="0" cy="0"/>
+          <a:chOff x="0" y="0"/>
+          <a:chExt cx="0" cy="0"/>
+        </a:xfrm>
+      </p:grpSpPr>
+      <p:sp>
+        <p:nvSpPr>
+          <p:cNvPr id="5" name="TextBox 4"/>
+          <p:cNvSpPr txBox="1"/>
+          <p:nvPr/>
+        </p:nvSpPr>
+        <p:spPr>
+          <a:xfrm>
+            <a:off x="351692" y="574431"/>
+            <a:ext cx="8475785" cy="6063198"/>
+          </a:xfrm>
+          <a:prstGeom prst="rect">
+            <a:avLst/>
+          </a:prstGeom>
+          <a:noFill/>
+        </p:spPr>
+        <p:txBody>
+          <a:bodyPr wrap="square" rtlCol="0">
+            <a:spAutoFit/>
+          </a:bodyPr>
+          <a:lstStyle/>
+          <a:p>
+            <a:pPr algn="ctr"/>
+            <a:r>
+              <a:rPr lang="en-US" sz="2800" dirty="0" smtClean="0"/>
+              <a:t>What’s Next?</a:t>
+            </a:r>
+          </a:p>
+          <a:p>
+            <a:pPr marL="457200" indent="-457200">
+              <a:buFont typeface="Arial" panose="020B0604020202020204" pitchFamily="34" charset="0"/>
+              <a:buChar char="•"/>
+            </a:pPr>
+            <a:endParaRPr lang="en-US" sz="2400" dirty="0" smtClean="0"/>
+          </a:p>
+          <a:p>
+            <a:pPr marL="457200" indent="-457200">
+              <a:buFont typeface="Arial" panose="020B0604020202020204" pitchFamily="34" charset="0"/>
+              <a:buChar char="•"/>
+            </a:pPr>
+            <a:r>
+              <a:rPr lang="en-US" sz="2400" dirty="0" smtClean="0"/>
+              <a:t>First stage: finish coding Montalvo’s Book I and “synch” with Southey encoding. Survey our results.</a:t>
+            </a:r>
+          </a:p>
+          <a:p>
+            <a:pPr marL="457200" indent="-457200">
+              <a:buFont typeface="Arial" panose="020B0604020202020204" pitchFamily="34" charset="0"/>
+              <a:buChar char="•"/>
+            </a:pPr>
+            <a:r>
+              <a:rPr lang="en-US" sz="2400" dirty="0" smtClean="0"/>
+              <a:t>Develop a way to classify the kinds of alterations Southey makes to Montalvo</a:t>
+            </a:r>
+          </a:p>
+          <a:p>
+            <a:pPr marL="457200" indent="-457200">
+              <a:buFont typeface="Arial" panose="020B0604020202020204" pitchFamily="34" charset="0"/>
+              <a:buChar char="•"/>
+            </a:pPr>
+            <a:r>
+              <a:rPr lang="en-US" sz="2400" dirty="0"/>
+              <a:t>Train an OCR method to assist us. Transcription goes slowly</a:t>
+            </a:r>
+            <a:r>
+              <a:rPr lang="en-US" sz="2400" dirty="0" smtClean="0"/>
+              <a:t>.</a:t>
+            </a:r>
+          </a:p>
+          <a:p>
+            <a:pPr lvl="7"/>
+            <a:r>
+              <a:rPr lang="en-US" sz="2400" dirty="0" smtClean="0"/>
+              <a:t>Then….</a:t>
+            </a:r>
+          </a:p>
+          <a:p>
+            <a:pPr marL="342900" indent="-342900">
+              <a:buFont typeface="Arial" panose="020B0604020202020204" pitchFamily="34" charset="0"/>
+              <a:buChar char="•"/>
+            </a:pPr>
+            <a:r>
+              <a:rPr lang="en-US" sz="2400" dirty="0" smtClean="0"/>
+              <a:t>Code the two French and two English translations and apply the same markup to compare the kinds of change</a:t>
+            </a:r>
+          </a:p>
+          <a:p>
+            <a:endParaRPr lang="en-US" sz="2400" dirty="0" smtClean="0"/>
+          </a:p>
+          <a:p>
+            <a:r>
+              <a:rPr lang="en-US" sz="2400" dirty="0" smtClean="0"/>
+              <a:t>Long-range question: </a:t>
+            </a:r>
+          </a:p>
+          <a:p>
+            <a:pPr marL="342900" indent="-342900">
+              <a:buFont typeface="Arial" panose="020B0604020202020204" pitchFamily="34" charset="0"/>
+              <a:buChar char="•"/>
+            </a:pPr>
+            <a:r>
+              <a:rPr lang="en-US" sz="2400" b="1" dirty="0" smtClean="0"/>
+              <a:t>What does life-cycle and translation cycle of </a:t>
+            </a:r>
+            <a:r>
+              <a:rPr lang="en-US" sz="2400" b="1" dirty="0" err="1" smtClean="0"/>
+              <a:t>Amadis</a:t>
+            </a:r>
+            <a:r>
+              <a:rPr lang="en-US" sz="2400" b="1" dirty="0" smtClean="0"/>
+              <a:t> tell us about the way fiction is translated across genres, cultures, centuries</a:t>
+            </a:r>
+            <a:r>
+              <a:rPr lang="en-US" b="1" dirty="0" smtClean="0"/>
+              <a:t>?</a:t>
+            </a:r>
+            <a:endParaRPr lang="en-US" sz="2400" b="1" dirty="0" smtClean="0"/>
+          </a:p>
+        </p:txBody>
+      </p:sp>
+    </p:spTree>
+    <p:extLst>
+      <p:ext uri="{BB962C8B-B14F-4D97-AF65-F5344CB8AC3E}">
+        <p14:creationId xmlns:p14="http://schemas.microsoft.com/office/powerpoint/2010/main" val="2889790714"/>
       </p:ext>
     </p:extLst>
   </p:cSld>

</xml_diff>

<commit_message>
resized and cropped some images
</commit_message>
<xml_diff>
--- a/Conference_prep/Amadis_tei_conf_images.pptx
+++ b/Conference_prep/Amadis_tei_conf_images.pptx
@@ -130,7 +130,7 @@
   </p:defaultTextStyle>
   <p:extLst>
     <p:ext uri="{EFAFB233-063F-42B5-8137-9DF3F51BA10A}">
-      <p15:sldGuideLst xmlns:p15="http://schemas.microsoft.com/office/powerpoint/2012/main">
+      <p15:sldGuideLst xmlns:p15="http://schemas.microsoft.com/office/powerpoint/2012/main" xmlns="">
         <p15:guide id="1" orient="horz" pos="2160">
           <p15:clr>
             <a:srgbClr val="A4A3A4"/>
@@ -229,7 +229,7 @@
           <a:p>
             <a:fld id="{1567ADDC-A5F7-6948-9B24-2C078ECBC864}" type="datetimeFigureOut">
               <a:rPr lang="en-US" smtClean="0"/>
-              <a:t>10/30/2015</a:t>
+              <a:t>10/30/15</a:t>
             </a:fld>
             <a:endParaRPr lang="en-US"/>
           </a:p>
@@ -1143,11 +1143,7 @@
             </a:r>
             <a:r>
               <a:rPr lang="en-US" baseline="0" dirty="0" smtClean="0"/>
-              <a:t> </a:t>
-            </a:r>
-            <a:r>
-              <a:rPr lang="en-US" baseline="0" dirty="0" smtClean="0"/>
-              <a:t>Sabel: This is an HTML view pulled from our feature structures markup for a chapter. The higher the number, the more compression Southey applied.</a:t>
+              <a:t> Sabel: This is an HTML view pulled from our feature structures markup for a chapter. The higher the number, the more compression Southey applied.</a:t>
             </a:r>
             <a:endParaRPr lang="en-US" dirty="0"/>
           </a:p>
@@ -1786,7 +1782,6 @@
               <a:rPr lang="en-US" baseline="0" dirty="0" smtClean="0"/>
               <a:t> another translation. </a:t>
             </a:r>
-            <a:endParaRPr lang="en-US" baseline="0" dirty="0" smtClean="0"/>
           </a:p>
           <a:p>
             <a:r>
@@ -2532,11 +2527,7 @@
             </a:r>
             <a:r>
               <a:rPr lang="en-US" baseline="0" dirty="0" smtClean="0"/>
-              <a:t> </a:t>
-            </a:r>
-            <a:r>
-              <a:rPr lang="en-US" baseline="0" dirty="0" smtClean="0"/>
-              <a:t>slide. </a:t>
+              <a:t> slide. </a:t>
             </a:r>
             <a:r>
               <a:rPr lang="en-US" b="1" baseline="0" dirty="0" smtClean="0"/>
@@ -2648,11 +2639,7 @@
             </a:r>
             <a:r>
               <a:rPr lang="en-US" baseline="0" dirty="0" smtClean="0"/>
-              <a:t> aligned to Montalvo with </a:t>
-            </a:r>
-            <a:r>
-              <a:rPr lang="en-US" baseline="0" dirty="0" smtClean="0"/>
-              <a:t>self-closing anchor elements. These mark with @synch alignment points with Montalvo. (We aren’t using </a:t>
+              <a:t> aligned to Montalvo with self-closing anchor elements. These mark with @synch alignment points with Montalvo. (We aren’t using </a:t>
             </a:r>
             <a:r>
               <a:rPr lang="en-US" baseline="0" dirty="0" err="1" smtClean="0"/>
@@ -2906,7 +2893,7 @@
           <a:p>
             <a:fld id="{6BFECD78-3C8E-49F2-8FAB-59489D168ABB}" type="datetimeFigureOut">
               <a:rPr lang="en-US" smtClean="0"/>
-              <a:t>10/30/2015</a:t>
+              <a:t>10/30/15</a:t>
             </a:fld>
             <a:endParaRPr lang="en-US"/>
           </a:p>
@@ -3107,7 +3094,7 @@
           <a:p>
             <a:fld id="{6BFECD78-3C8E-49F2-8FAB-59489D168ABB}" type="datetimeFigureOut">
               <a:rPr lang="en-US" smtClean="0"/>
-              <a:t>10/30/2015</a:t>
+              <a:t>10/30/15</a:t>
             </a:fld>
             <a:endParaRPr lang="en-US"/>
           </a:p>
@@ -3282,7 +3269,7 @@
           <a:p>
             <a:fld id="{6BFECD78-3C8E-49F2-8FAB-59489D168ABB}" type="datetimeFigureOut">
               <a:rPr lang="en-US" smtClean="0"/>
-              <a:t>10/30/2015</a:t>
+              <a:t>10/30/15</a:t>
             </a:fld>
             <a:endParaRPr lang="en-US"/>
           </a:p>
@@ -3447,7 +3434,7 @@
           <a:p>
             <a:fld id="{6BFECD78-3C8E-49F2-8FAB-59489D168ABB}" type="datetimeFigureOut">
               <a:rPr lang="en-US" smtClean="0"/>
-              <a:t>10/30/2015</a:t>
+              <a:t>10/30/15</a:t>
             </a:fld>
             <a:endParaRPr lang="en-US"/>
           </a:p>
@@ -3695,7 +3682,7 @@
           <a:p>
             <a:fld id="{6BFECD78-3C8E-49F2-8FAB-59489D168ABB}" type="datetimeFigureOut">
               <a:rPr lang="en-US" smtClean="0"/>
-              <a:t>10/30/2015</a:t>
+              <a:t>10/30/15</a:t>
             </a:fld>
             <a:endParaRPr lang="en-US"/>
           </a:p>
@@ -4013,7 +4000,7 @@
           <a:p>
             <a:fld id="{6BFECD78-3C8E-49F2-8FAB-59489D168ABB}" type="datetimeFigureOut">
               <a:rPr lang="en-US" smtClean="0"/>
-              <a:t>10/30/2015</a:t>
+              <a:t>10/30/15</a:t>
             </a:fld>
             <a:endParaRPr lang="en-US"/>
           </a:p>
@@ -4479,7 +4466,7 @@
           <a:p>
             <a:fld id="{6BFECD78-3C8E-49F2-8FAB-59489D168ABB}" type="datetimeFigureOut">
               <a:rPr lang="en-US" smtClean="0"/>
-              <a:t>10/30/2015</a:t>
+              <a:t>10/30/15</a:t>
             </a:fld>
             <a:endParaRPr lang="en-US"/>
           </a:p>
@@ -4627,7 +4614,7 @@
           <a:p>
             <a:fld id="{6BFECD78-3C8E-49F2-8FAB-59489D168ABB}" type="datetimeFigureOut">
               <a:rPr lang="en-US" smtClean="0"/>
-              <a:t>10/30/2015</a:t>
+              <a:t>10/30/15</a:t>
             </a:fld>
             <a:endParaRPr lang="en-US"/>
           </a:p>
@@ -4717,7 +4704,7 @@
           <a:p>
             <a:fld id="{6BFECD78-3C8E-49F2-8FAB-59489D168ABB}" type="datetimeFigureOut">
               <a:rPr lang="en-US" smtClean="0"/>
-              <a:t>10/30/2015</a:t>
+              <a:t>10/30/15</a:t>
             </a:fld>
             <a:endParaRPr lang="en-US"/>
           </a:p>
@@ -4991,7 +4978,7 @@
           <a:p>
             <a:fld id="{6BFECD78-3C8E-49F2-8FAB-59489D168ABB}" type="datetimeFigureOut">
               <a:rPr lang="en-US" smtClean="0"/>
-              <a:t>10/30/2015</a:t>
+              <a:t>10/30/15</a:t>
             </a:fld>
             <a:endParaRPr lang="en-US"/>
           </a:p>
@@ -5297,7 +5284,7 @@
           <a:p>
             <a:fld id="{6BFECD78-3C8E-49F2-8FAB-59489D168ABB}" type="datetimeFigureOut">
               <a:rPr lang="en-US" smtClean="0"/>
-              <a:t>10/30/2015</a:t>
+              <a:t>10/30/15</a:t>
             </a:fld>
             <a:endParaRPr lang="en-US"/>
           </a:p>
@@ -5595,7 +5582,7 @@
           <a:p>
             <a:fld id="{6BFECD78-3C8E-49F2-8FAB-59489D168ABB}" type="datetimeFigureOut">
               <a:rPr lang="en-US" smtClean="0"/>
-              <a:t>10/30/2015</a:t>
+              <a:t>10/30/15</a:t>
             </a:fld>
             <a:endParaRPr lang="en-US"/>
           </a:p>
@@ -6178,6 +6165,13 @@
   <p:clrMapOvr>
     <a:masterClrMapping/>
   </p:clrMapOvr>
+  <p:timing>
+    <p:tnLst>
+      <p:par>
+        <p:cTn xmlns:p14="http://schemas.microsoft.com/office/powerpoint/2010/main" id="1" dur="indefinite" restart="never" nodeType="tmRoot"/>
+      </p:par>
+    </p:tnLst>
+  </p:timing>
 </p:sld>
 </file>
 
@@ -6335,7 +6329,7 @@
   <p:timing>
     <p:tnLst>
       <p:par>
-        <p:cTn id="1" dur="indefinite" restart="never" nodeType="tmRoot"/>
+        <p:cTn xmlns:p14="http://schemas.microsoft.com/office/powerpoint/2010/main" id="1" dur="indefinite" restart="never" nodeType="tmRoot"/>
       </p:par>
     </p:tnLst>
   </p:timing>
@@ -6692,7 +6686,7 @@
   <p:timing>
     <p:tnLst>
       <p:par>
-        <p:cTn id="1" dur="indefinite" restart="never" nodeType="tmRoot"/>
+        <p:cTn xmlns:p14="http://schemas.microsoft.com/office/powerpoint/2010/main" id="1" dur="indefinite" restart="never" nodeType="tmRoot"/>
       </p:par>
     </p:tnLst>
   </p:timing>
@@ -8053,7 +8047,7 @@
   <p:timing>
     <p:tnLst>
       <p:par>
-        <p:cTn id="1" dur="indefinite" restart="never" nodeType="tmRoot"/>
+        <p:cTn xmlns:p14="http://schemas.microsoft.com/office/powerpoint/2010/main" id="1" dur="indefinite" restart="never" nodeType="tmRoot"/>
       </p:par>
     </p:tnLst>
   </p:timing>
@@ -8093,8 +8087,8 @@
         </p:blipFill>
         <p:spPr>
           <a:xfrm>
-            <a:off x="836044" y="93785"/>
-            <a:ext cx="7675155" cy="6764215"/>
+            <a:off x="980719" y="387280"/>
+            <a:ext cx="7196216" cy="6342120"/>
           </a:xfrm>
           <a:prstGeom prst="rect">
             <a:avLst/>
@@ -8114,7 +8108,7 @@
   <p:timing>
     <p:tnLst>
       <p:par>
-        <p:cTn id="1" dur="indefinite" restart="never" nodeType="tmRoot"/>
+        <p:cTn xmlns:p14="http://schemas.microsoft.com/office/powerpoint/2010/main" id="1" dur="indefinite" restart="never" nodeType="tmRoot"/>
       </p:par>
     </p:tnLst>
   </p:timing>
@@ -8179,7 +8173,7 @@
   <p:timing>
     <p:tnLst>
       <p:par>
-        <p:cTn id="1" dur="indefinite" restart="never" nodeType="tmRoot"/>
+        <p:cTn xmlns:p14="http://schemas.microsoft.com/office/powerpoint/2010/main" id="1" dur="indefinite" restart="never" nodeType="tmRoot"/>
       </p:par>
     </p:tnLst>
   </p:timing>
@@ -9053,7 +9047,7 @@
   <p:timing>
     <p:tnLst>
       <p:par>
-        <p:cTn id="1" dur="indefinite" restart="never" nodeType="tmRoot"/>
+        <p:cTn xmlns:p14="http://schemas.microsoft.com/office/powerpoint/2010/main" id="1" dur="indefinite" restart="never" nodeType="tmRoot"/>
       </p:par>
     </p:tnLst>
   </p:timing>
@@ -9120,7 +9114,7 @@
   <p:timing>
     <p:tnLst>
       <p:par>
-        <p:cTn id="1" dur="indefinite" restart="never" nodeType="tmRoot"/>
+        <p:cTn xmlns:p14="http://schemas.microsoft.com/office/powerpoint/2010/main" id="1" dur="indefinite" restart="never" nodeType="tmRoot"/>
       </p:par>
     </p:tnLst>
   </p:timing>
@@ -9236,7 +9230,7 @@
   <p:timing>
     <p:tnLst>
       <p:par>
-        <p:cTn id="1" dur="indefinite" restart="never" nodeType="tmRoot"/>
+        <p:cTn xmlns:p14="http://schemas.microsoft.com/office/powerpoint/2010/main" id="1" dur="indefinite" restart="never" nodeType="tmRoot"/>
       </p:par>
     </p:tnLst>
   </p:timing>
@@ -9303,7 +9297,7 @@
   <p:timing>
     <p:tnLst>
       <p:par>
-        <p:cTn id="1" dur="indefinite" restart="never" nodeType="tmRoot"/>
+        <p:cTn xmlns:p14="http://schemas.microsoft.com/office/powerpoint/2010/main" id="1" dur="indefinite" restart="never" nodeType="tmRoot"/>
       </p:par>
     </p:tnLst>
   </p:timing>
@@ -9370,7 +9364,7 @@
   <p:timing>
     <p:tnLst>
       <p:par>
-        <p:cTn id="1" dur="indefinite" restart="never" nodeType="tmRoot"/>
+        <p:cTn xmlns:p14="http://schemas.microsoft.com/office/powerpoint/2010/main" id="1" dur="indefinite" restart="never" nodeType="tmRoot"/>
       </p:par>
     </p:tnLst>
   </p:timing>
@@ -9419,11 +9413,71 @@
         </p:blipFill>
         <p:spPr>
           <a:xfrm>
-            <a:off x="457200" y="988219"/>
+            <a:off x="457200" y="522044"/>
             <a:ext cx="8229600" cy="4876800"/>
           </a:xfrm>
         </p:spPr>
       </p:pic>
+      <p:sp>
+        <p:nvSpPr>
+          <p:cNvPr id="2" name="TextBox 1"/>
+          <p:cNvSpPr txBox="1"/>
+          <p:nvPr/>
+        </p:nvSpPr>
+        <p:spPr>
+          <a:xfrm>
+            <a:off x="594863" y="5214178"/>
+            <a:ext cx="6125475" cy="646331"/>
+          </a:xfrm>
+          <a:prstGeom prst="rect">
+            <a:avLst/>
+          </a:prstGeom>
+          <a:noFill/>
+        </p:spPr>
+        <p:txBody>
+          <a:bodyPr wrap="square" rtlCol="0">
+            <a:spAutoFit/>
+          </a:bodyPr>
+          <a:lstStyle/>
+          <a:p>
+            <a:r>
+              <a:rPr lang="en-US" dirty="0" err="1" smtClean="0"/>
+              <a:t>amadis.newtfire.org</a:t>
+            </a:r>
+            <a:endParaRPr lang="en-US" dirty="0" smtClean="0"/>
+          </a:p>
+          <a:p>
+            <a:r>
+              <a:rPr lang="en-US" dirty="0"/>
+              <a:t>https://</a:t>
+            </a:r>
+            <a:r>
+              <a:rPr lang="en-US" dirty="0" err="1"/>
+              <a:t>github.com</a:t>
+            </a:r>
+            <a:r>
+              <a:rPr lang="en-US" dirty="0"/>
+              <a:t>/</a:t>
+            </a:r>
+            <a:r>
+              <a:rPr lang="en-US" dirty="0" err="1"/>
+              <a:t>ebeshero</a:t>
+            </a:r>
+            <a:r>
+              <a:rPr lang="en-US" dirty="0"/>
+              <a:t>/</a:t>
+            </a:r>
+            <a:r>
+              <a:rPr lang="en-US" dirty="0" err="1"/>
+              <a:t>Amadis</a:t>
+            </a:r>
+            <a:r>
+              <a:rPr lang="en-US" dirty="0"/>
+              <a:t>-in-Translation</a:t>
+            </a:r>
+          </a:p>
+        </p:txBody>
+      </p:sp>
     </p:spTree>
     <p:extLst>
       <p:ext uri="{BB962C8B-B14F-4D97-AF65-F5344CB8AC3E}">
@@ -9437,7 +9491,7 @@
   <p:timing>
     <p:tnLst>
       <p:par>
-        <p:cTn id="1" dur="indefinite" restart="never" nodeType="tmRoot"/>
+        <p:cTn xmlns:p14="http://schemas.microsoft.com/office/powerpoint/2010/main" id="1" dur="indefinite" restart="never" nodeType="tmRoot"/>
       </p:par>
     </p:tnLst>
   </p:timing>
@@ -9471,16 +9525,15 @@
             <p:ph idx="1"/>
           </p:nvPr>
         </p:nvPicPr>
-        <p:blipFill>
+        <p:blipFill rotWithShape="1">
           <a:blip r:embed="rId3"/>
-          <a:stretch>
-            <a:fillRect/>
-          </a:stretch>
+          <a:srcRect l="9045" t="5254" r="13964" b="1964"/>
+          <a:stretch/>
         </p:blipFill>
         <p:spPr>
           <a:xfrm>
-            <a:off x="1922585" y="51163"/>
-            <a:ext cx="4443046" cy="6686897"/>
+            <a:off x="2556301" y="450100"/>
+            <a:ext cx="3456633" cy="6269254"/>
           </a:xfrm>
           <a:prstGeom prst="rect">
             <a:avLst/>
@@ -9500,7 +9553,7 @@
   <p:timing>
     <p:tnLst>
       <p:par>
-        <p:cTn id="1" dur="indefinite" restart="never" nodeType="tmRoot"/>
+        <p:cTn xmlns:p14="http://schemas.microsoft.com/office/powerpoint/2010/main" id="1" dur="indefinite" restart="never" nodeType="tmRoot"/>
       </p:par>
     </p:tnLst>
   </p:timing>
@@ -9597,7 +9650,7 @@
   <p:timing>
     <p:tnLst>
       <p:par>
-        <p:cTn id="1" dur="indefinite" restart="never" nodeType="tmRoot"/>
+        <p:cTn xmlns:p14="http://schemas.microsoft.com/office/powerpoint/2010/main" id="1" dur="indefinite" restart="never" nodeType="tmRoot"/>
       </p:par>
     </p:tnLst>
   </p:timing>
@@ -9630,7 +9683,7 @@
         <p:spPr>
           <a:xfrm>
             <a:off x="351692" y="574431"/>
-            <a:ext cx="8475785" cy="6063198"/>
+            <a:ext cx="8475785" cy="5324534"/>
           </a:xfrm>
           <a:prstGeom prst="rect">
             <a:avLst/>
@@ -9663,8 +9716,13 @@
             </a:pPr>
             <a:r>
               <a:rPr lang="en-US" sz="2400" dirty="0" smtClean="0"/>
-              <a:t>First stage: finish coding Montalvo’s Book I and “synch” with Southey encoding. Survey our results.</a:t>
-            </a:r>
+              <a:t>Finish </a:t>
+            </a:r>
+            <a:r>
+              <a:rPr lang="en-US" sz="2400" dirty="0" smtClean="0"/>
+              <a:t>coding Montalvo’s Book I and “synch” with Southey encoding. </a:t>
+            </a:r>
+            <a:endParaRPr lang="en-US" sz="2400" dirty="0"/>
           </a:p>
           <a:p>
             <a:pPr marL="457200" indent="-457200">
@@ -9673,7 +9731,19 @@
             </a:pPr>
             <a:r>
               <a:rPr lang="en-US" sz="2400" dirty="0" smtClean="0"/>
-              <a:t>Develop a way to classify the kinds of alterations Southey makes to Montalvo</a:t>
+              <a:t>Classify </a:t>
+            </a:r>
+            <a:r>
+              <a:rPr lang="en-US" sz="2400" dirty="0" smtClean="0"/>
+              <a:t>the </a:t>
+            </a:r>
+            <a:r>
+              <a:rPr lang="en-US" sz="2400" dirty="0" smtClean="0"/>
+              <a:t>alterations </a:t>
+            </a:r>
+            <a:r>
+              <a:rPr lang="en-US" sz="2400" dirty="0" smtClean="0"/>
+              <a:t>Southey makes to Montalvo</a:t>
             </a:r>
           </a:p>
           <a:p>
@@ -9683,12 +9753,9 @@
             </a:pPr>
             <a:r>
               <a:rPr lang="en-US" sz="2400" dirty="0"/>
-              <a:t>Train an OCR method to assist us. Transcription goes slowly</a:t>
-            </a:r>
-            <a:r>
-              <a:rPr lang="en-US" sz="2400" dirty="0" smtClean="0"/>
-              <a:t>.</a:t>
-            </a:r>
+              <a:t>Train an OCR method to assist us. </a:t>
+            </a:r>
+            <a:endParaRPr lang="en-US" sz="2400" dirty="0" smtClean="0"/>
           </a:p>
           <a:p>
             <a:pPr lvl="7"/>
@@ -9723,7 +9790,15 @@
             </a:pPr>
             <a:r>
               <a:rPr lang="en-US" sz="2400" b="1" dirty="0" smtClean="0"/>
-              <a:t>What does life-cycle and translation cycle of </a:t>
+              <a:t>What does </a:t>
+            </a:r>
+            <a:r>
+              <a:rPr lang="en-US" sz="2400" b="1" dirty="0" smtClean="0"/>
+              <a:t>life cycle </a:t>
+            </a:r>
+            <a:r>
+              <a:rPr lang="en-US" sz="2400" b="1" dirty="0" smtClean="0"/>
+              <a:t>and translation cycle of </a:t>
             </a:r>
             <a:r>
               <a:rPr lang="en-US" sz="2400" b="1" dirty="0" err="1" smtClean="0"/>
@@ -9754,7 +9829,7 @@
   <p:timing>
     <p:tnLst>
       <p:par>
-        <p:cTn id="1" dur="indefinite" restart="never" nodeType="tmRoot"/>
+        <p:cTn xmlns:p14="http://schemas.microsoft.com/office/powerpoint/2010/main" id="1" dur="indefinite" restart="never" nodeType="tmRoot"/>
       </p:par>
     </p:tnLst>
   </p:timing>
@@ -9817,7 +9892,7 @@
         <p:spPr>
           <a:xfrm>
             <a:off x="4492625" y="697529"/>
-            <a:ext cx="4032250" cy="5623080"/>
+            <a:ext cx="4032250" cy="5955479"/>
           </a:xfrm>
           <a:prstGeom prst="rect">
             <a:avLst/>
@@ -9901,8 +9976,26 @@
             </a:r>
             <a:r>
               <a:rPr lang="en-US" dirty="0" smtClean="0"/>
-              <a:t>(1508)</a:t>
-            </a:r>
+              <a:t>(1508</a:t>
+            </a:r>
+            <a:r>
+              <a:rPr lang="en-US" dirty="0" smtClean="0"/>
+              <a:t>)</a:t>
+            </a:r>
+          </a:p>
+          <a:p>
+            <a:pPr marL="285750" indent="-285750">
+              <a:lnSpc>
+                <a:spcPct val="120000"/>
+              </a:lnSpc>
+              <a:buFont typeface="Arial"/>
+              <a:buChar char="•"/>
+            </a:pPr>
+            <a:r>
+              <a:rPr lang="en-US" dirty="0" smtClean="0"/>
+              <a:t>Spanish editions (1526, 1533)</a:t>
+            </a:r>
+            <a:endParaRPr lang="en-US" dirty="0" smtClean="0"/>
           </a:p>
           <a:p>
             <a:pPr marL="285750" indent="-285750">
@@ -10034,7 +10127,7 @@
   <p:timing>
     <p:tnLst>
       <p:par>
-        <p:cTn id="1" dur="indefinite" restart="never" nodeType="tmRoot"/>
+        <p:cTn xmlns:p14="http://schemas.microsoft.com/office/powerpoint/2010/main" id="1" dur="indefinite" restart="never" nodeType="tmRoot"/>
       </p:par>
     </p:tnLst>
   </p:timing>
@@ -10101,7 +10194,7 @@
   <p:timing>
     <p:tnLst>
       <p:par>
-        <p:cTn id="1" dur="indefinite" restart="never" nodeType="tmRoot"/>
+        <p:cTn xmlns:p14="http://schemas.microsoft.com/office/powerpoint/2010/main" id="1" dur="indefinite" restart="never" nodeType="tmRoot"/>
       </p:par>
     </p:tnLst>
   </p:timing>
@@ -10377,7 +10470,7 @@
   <p:timing>
     <p:tnLst>
       <p:par>
-        <p:cTn id="1" dur="indefinite" restart="never" nodeType="tmRoot"/>
+        <p:cTn xmlns:p14="http://schemas.microsoft.com/office/powerpoint/2010/main" id="1" dur="indefinite" restart="never" nodeType="tmRoot"/>
       </p:par>
     </p:tnLst>
   </p:timing>
@@ -10614,7 +10707,7 @@
   <p:timing>
     <p:tnLst>
       <p:par>
-        <p:cTn id="1" dur="indefinite" restart="never" nodeType="tmRoot"/>
+        <p:cTn xmlns:p14="http://schemas.microsoft.com/office/powerpoint/2010/main" id="1" dur="indefinite" restart="never" nodeType="tmRoot"/>
       </p:par>
     </p:tnLst>
   </p:timing>
@@ -10679,7 +10772,7 @@
   <p:timing>
     <p:tnLst>
       <p:par>
-        <p:cTn id="1" dur="indefinite" restart="never" nodeType="tmRoot"/>
+        <p:cTn xmlns:p14="http://schemas.microsoft.com/office/powerpoint/2010/main" id="1" dur="indefinite" restart="never" nodeType="tmRoot"/>
       </p:par>
     </p:tnLst>
   </p:timing>
@@ -10746,7 +10839,7 @@
   <p:timing>
     <p:tnLst>
       <p:par>
-        <p:cTn id="1" dur="indefinite" restart="never" nodeType="tmRoot"/>
+        <p:cTn xmlns:p14="http://schemas.microsoft.com/office/powerpoint/2010/main" id="1" dur="indefinite" restart="never" nodeType="tmRoot"/>
       </p:par>
     </p:tnLst>
   </p:timing>
@@ -10813,7 +10906,7 @@
   <p:timing>
     <p:tnLst>
       <p:par>
-        <p:cTn id="1" dur="indefinite" restart="never" nodeType="tmRoot"/>
+        <p:cTn xmlns:p14="http://schemas.microsoft.com/office/powerpoint/2010/main" id="1" dur="indefinite" restart="never" nodeType="tmRoot"/>
       </p:par>
     </p:tnLst>
   </p:timing>

</xml_diff>

<commit_message>
git merge time! mutual revisions! woohoo!
</commit_message>
<xml_diff>
--- a/Conference_prep/Amadis_tei_conf_images.pptx
+++ b/Conference_prep/Amadis_tei_conf_images.pptx
@@ -130,7 +130,7 @@
   </p:defaultTextStyle>
   <p:extLst>
     <p:ext uri="{EFAFB233-063F-42B5-8137-9DF3F51BA10A}">
-      <p15:sldGuideLst xmlns:p15="http://schemas.microsoft.com/office/powerpoint/2012/main" xmlns="">
+      <p15:sldGuideLst xmlns:p15="http://schemas.microsoft.com/office/powerpoint/2012/main">
         <p15:guide id="1" orient="horz" pos="2160">
           <p15:clr>
             <a:srgbClr val="A4A3A4"/>
@@ -229,7 +229,7 @@
           <a:p>
             <a:fld id="{1567ADDC-A5F7-6948-9B24-2C078ECBC864}" type="datetimeFigureOut">
               <a:rPr lang="en-US" smtClean="0"/>
-              <a:t>10/30/15</a:t>
+              <a:t>10/31/2015</a:t>
             </a:fld>
             <a:endParaRPr lang="en-US"/>
           </a:p>
@@ -1043,9 +1043,13 @@
             </a:r>
             <a:r>
               <a:rPr lang="en-US" baseline="0" dirty="0" smtClean="0"/>
-              <a:t>, our signal of proportional difference in size between Montalvo and Southey. (The function round-half-to-even() can take two arguments—the “2” at the end indicates the number of decimal places.)</a:t>
-            </a:r>
-            <a:endParaRPr lang="en-US" dirty="0"/>
+              <a:t>, our signal of proportional difference in size between Montalvo and Southey. (The function round-half-to-even() can take two arguments—the “2” at the end indicates the number of decimal places</a:t>
+            </a:r>
+            <a:r>
+              <a:rPr lang="en-US" baseline="0" dirty="0" smtClean="0"/>
+              <a:t>.)</a:t>
+            </a:r>
+            <a:endParaRPr lang="en-US" b="1" dirty="0"/>
           </a:p>
         </p:txBody>
       </p:sp>
@@ -1143,8 +1147,38 @@
             </a:r>
             <a:r>
               <a:rPr lang="en-US" baseline="0" dirty="0" smtClean="0"/>
-              <a:t> Sabel: This is an HTML view pulled from our feature structures markup for a chapter. The higher the number, the more compression Southey applied.</a:t>
-            </a:r>
+              <a:t> Sabel: This is an HTML view pulled from our feature structures markup for a chapter. The higher the number, the more compression Southey applied</a:t>
+            </a:r>
+            <a:r>
+              <a:rPr lang="en-US" baseline="0" dirty="0" smtClean="0"/>
+              <a:t>.</a:t>
+            </a:r>
+          </a:p>
+          <a:p>
+            <a:pPr marL="0" marR="0" indent="0" algn="l" defTabSz="457200" rtl="0" eaLnBrk="1" fontAlgn="auto" latinLnBrk="0" hangingPunct="1">
+              <a:lnSpc>
+                <a:spcPct val="100000"/>
+              </a:lnSpc>
+              <a:spcBef>
+                <a:spcPts val="0"/>
+              </a:spcBef>
+              <a:spcAft>
+                <a:spcPts val="0"/>
+              </a:spcAft>
+              <a:buClrTx/>
+              <a:buSzTx/>
+              <a:buFontTx/>
+              <a:buNone/>
+              <a:tabLst/>
+              <a:defRPr/>
+            </a:pPr>
+            <a:r>
+              <a:rPr lang="en-US" b="1" baseline="0" smtClean="0"/>
+              <a:t>BACK to Stacey</a:t>
+            </a:r>
+            <a:endParaRPr lang="en-US" b="1" smtClean="0"/>
+          </a:p>
+          <a:p>
             <a:endParaRPr lang="en-US" dirty="0"/>
           </a:p>
         </p:txBody>
@@ -2893,7 +2927,7 @@
           <a:p>
             <a:fld id="{6BFECD78-3C8E-49F2-8FAB-59489D168ABB}" type="datetimeFigureOut">
               <a:rPr lang="en-US" smtClean="0"/>
-              <a:t>10/30/15</a:t>
+              <a:t>10/31/2015</a:t>
             </a:fld>
             <a:endParaRPr lang="en-US"/>
           </a:p>
@@ -3094,7 +3128,7 @@
           <a:p>
             <a:fld id="{6BFECD78-3C8E-49F2-8FAB-59489D168ABB}" type="datetimeFigureOut">
               <a:rPr lang="en-US" smtClean="0"/>
-              <a:t>10/30/15</a:t>
+              <a:t>10/31/2015</a:t>
             </a:fld>
             <a:endParaRPr lang="en-US"/>
           </a:p>
@@ -3269,7 +3303,7 @@
           <a:p>
             <a:fld id="{6BFECD78-3C8E-49F2-8FAB-59489D168ABB}" type="datetimeFigureOut">
               <a:rPr lang="en-US" smtClean="0"/>
-              <a:t>10/30/15</a:t>
+              <a:t>10/31/2015</a:t>
             </a:fld>
             <a:endParaRPr lang="en-US"/>
           </a:p>
@@ -3434,7 +3468,7 @@
           <a:p>
             <a:fld id="{6BFECD78-3C8E-49F2-8FAB-59489D168ABB}" type="datetimeFigureOut">
               <a:rPr lang="en-US" smtClean="0"/>
-              <a:t>10/30/15</a:t>
+              <a:t>10/31/2015</a:t>
             </a:fld>
             <a:endParaRPr lang="en-US"/>
           </a:p>
@@ -3682,7 +3716,7 @@
           <a:p>
             <a:fld id="{6BFECD78-3C8E-49F2-8FAB-59489D168ABB}" type="datetimeFigureOut">
               <a:rPr lang="en-US" smtClean="0"/>
-              <a:t>10/30/15</a:t>
+              <a:t>10/31/2015</a:t>
             </a:fld>
             <a:endParaRPr lang="en-US"/>
           </a:p>
@@ -4000,7 +4034,7 @@
           <a:p>
             <a:fld id="{6BFECD78-3C8E-49F2-8FAB-59489D168ABB}" type="datetimeFigureOut">
               <a:rPr lang="en-US" smtClean="0"/>
-              <a:t>10/30/15</a:t>
+              <a:t>10/31/2015</a:t>
             </a:fld>
             <a:endParaRPr lang="en-US"/>
           </a:p>
@@ -4466,7 +4500,7 @@
           <a:p>
             <a:fld id="{6BFECD78-3C8E-49F2-8FAB-59489D168ABB}" type="datetimeFigureOut">
               <a:rPr lang="en-US" smtClean="0"/>
-              <a:t>10/30/15</a:t>
+              <a:t>10/31/2015</a:t>
             </a:fld>
             <a:endParaRPr lang="en-US"/>
           </a:p>
@@ -4614,7 +4648,7 @@
           <a:p>
             <a:fld id="{6BFECD78-3C8E-49F2-8FAB-59489D168ABB}" type="datetimeFigureOut">
               <a:rPr lang="en-US" smtClean="0"/>
-              <a:t>10/30/15</a:t>
+              <a:t>10/31/2015</a:t>
             </a:fld>
             <a:endParaRPr lang="en-US"/>
           </a:p>
@@ -4704,7 +4738,7 @@
           <a:p>
             <a:fld id="{6BFECD78-3C8E-49F2-8FAB-59489D168ABB}" type="datetimeFigureOut">
               <a:rPr lang="en-US" smtClean="0"/>
-              <a:t>10/30/15</a:t>
+              <a:t>10/31/2015</a:t>
             </a:fld>
             <a:endParaRPr lang="en-US"/>
           </a:p>
@@ -4978,7 +5012,7 @@
           <a:p>
             <a:fld id="{6BFECD78-3C8E-49F2-8FAB-59489D168ABB}" type="datetimeFigureOut">
               <a:rPr lang="en-US" smtClean="0"/>
-              <a:t>10/30/15</a:t>
+              <a:t>10/31/2015</a:t>
             </a:fld>
             <a:endParaRPr lang="en-US"/>
           </a:p>
@@ -5284,7 +5318,7 @@
           <a:p>
             <a:fld id="{6BFECD78-3C8E-49F2-8FAB-59489D168ABB}" type="datetimeFigureOut">
               <a:rPr lang="en-US" smtClean="0"/>
-              <a:t>10/30/15</a:t>
+              <a:t>10/31/2015</a:t>
             </a:fld>
             <a:endParaRPr lang="en-US"/>
           </a:p>
@@ -5582,7 +5616,7 @@
           <a:p>
             <a:fld id="{6BFECD78-3C8E-49F2-8FAB-59489D168ABB}" type="datetimeFigureOut">
               <a:rPr lang="en-US" smtClean="0"/>
-              <a:t>10/30/15</a:t>
+              <a:t>10/31/2015</a:t>
             </a:fld>
             <a:endParaRPr lang="en-US"/>
           </a:p>
@@ -6168,7 +6202,7 @@
   <p:timing>
     <p:tnLst>
       <p:par>
-        <p:cTn xmlns:p14="http://schemas.microsoft.com/office/powerpoint/2010/main" id="1" dur="indefinite" restart="never" nodeType="tmRoot"/>
+        <p:cTn id="1" dur="indefinite" restart="never" nodeType="tmRoot"/>
       </p:par>
     </p:tnLst>
   </p:timing>
@@ -6329,7 +6363,7 @@
   <p:timing>
     <p:tnLst>
       <p:par>
-        <p:cTn xmlns:p14="http://schemas.microsoft.com/office/powerpoint/2010/main" id="1" dur="indefinite" restart="never" nodeType="tmRoot"/>
+        <p:cTn id="1" dur="indefinite" restart="never" nodeType="tmRoot"/>
       </p:par>
     </p:tnLst>
   </p:timing>
@@ -6686,7 +6720,7 @@
   <p:timing>
     <p:tnLst>
       <p:par>
-        <p:cTn xmlns:p14="http://schemas.microsoft.com/office/powerpoint/2010/main" id="1" dur="indefinite" restart="never" nodeType="tmRoot"/>
+        <p:cTn id="1" dur="indefinite" restart="never" nodeType="tmRoot"/>
       </p:par>
     </p:tnLst>
   </p:timing>
@@ -8047,7 +8081,7 @@
   <p:timing>
     <p:tnLst>
       <p:par>
-        <p:cTn xmlns:p14="http://schemas.microsoft.com/office/powerpoint/2010/main" id="1" dur="indefinite" restart="never" nodeType="tmRoot"/>
+        <p:cTn id="1" dur="indefinite" restart="never" nodeType="tmRoot"/>
       </p:par>
     </p:tnLst>
   </p:timing>
@@ -8108,7 +8142,7 @@
   <p:timing>
     <p:tnLst>
       <p:par>
-        <p:cTn xmlns:p14="http://schemas.microsoft.com/office/powerpoint/2010/main" id="1" dur="indefinite" restart="never" nodeType="tmRoot"/>
+        <p:cTn id="1" dur="indefinite" restart="never" nodeType="tmRoot"/>
       </p:par>
     </p:tnLst>
   </p:timing>
@@ -8173,7 +8207,7 @@
   <p:timing>
     <p:tnLst>
       <p:par>
-        <p:cTn xmlns:p14="http://schemas.microsoft.com/office/powerpoint/2010/main" id="1" dur="indefinite" restart="never" nodeType="tmRoot"/>
+        <p:cTn id="1" dur="indefinite" restart="never" nodeType="tmRoot"/>
       </p:par>
     </p:tnLst>
   </p:timing>
@@ -9047,7 +9081,7 @@
   <p:timing>
     <p:tnLst>
       <p:par>
-        <p:cTn xmlns:p14="http://schemas.microsoft.com/office/powerpoint/2010/main" id="1" dur="indefinite" restart="never" nodeType="tmRoot"/>
+        <p:cTn id="1" dur="indefinite" restart="never" nodeType="tmRoot"/>
       </p:par>
     </p:tnLst>
   </p:timing>
@@ -9114,7 +9148,7 @@
   <p:timing>
     <p:tnLst>
       <p:par>
-        <p:cTn xmlns:p14="http://schemas.microsoft.com/office/powerpoint/2010/main" id="1" dur="indefinite" restart="never" nodeType="tmRoot"/>
+        <p:cTn id="1" dur="indefinite" restart="never" nodeType="tmRoot"/>
       </p:par>
     </p:tnLst>
   </p:timing>
@@ -9230,7 +9264,7 @@
   <p:timing>
     <p:tnLst>
       <p:par>
-        <p:cTn xmlns:p14="http://schemas.microsoft.com/office/powerpoint/2010/main" id="1" dur="indefinite" restart="never" nodeType="tmRoot"/>
+        <p:cTn id="1" dur="indefinite" restart="never" nodeType="tmRoot"/>
       </p:par>
     </p:tnLst>
   </p:timing>
@@ -9297,7 +9331,7 @@
   <p:timing>
     <p:tnLst>
       <p:par>
-        <p:cTn xmlns:p14="http://schemas.microsoft.com/office/powerpoint/2010/main" id="1" dur="indefinite" restart="never" nodeType="tmRoot"/>
+        <p:cTn id="1" dur="indefinite" restart="never" nodeType="tmRoot"/>
       </p:par>
     </p:tnLst>
   </p:timing>
@@ -9364,7 +9398,7 @@
   <p:timing>
     <p:tnLst>
       <p:par>
-        <p:cTn xmlns:p14="http://schemas.microsoft.com/office/powerpoint/2010/main" id="1" dur="indefinite" restart="never" nodeType="tmRoot"/>
+        <p:cTn id="1" dur="indefinite" restart="never" nodeType="tmRoot"/>
       </p:par>
     </p:tnLst>
   </p:timing>
@@ -9491,7 +9525,7 @@
   <p:timing>
     <p:tnLst>
       <p:par>
-        <p:cTn xmlns:p14="http://schemas.microsoft.com/office/powerpoint/2010/main" id="1" dur="indefinite" restart="never" nodeType="tmRoot"/>
+        <p:cTn id="1" dur="indefinite" restart="never" nodeType="tmRoot"/>
       </p:par>
     </p:tnLst>
   </p:timing>
@@ -9553,7 +9587,7 @@
   <p:timing>
     <p:tnLst>
       <p:par>
-        <p:cTn xmlns:p14="http://schemas.microsoft.com/office/powerpoint/2010/main" id="1" dur="indefinite" restart="never" nodeType="tmRoot"/>
+        <p:cTn id="1" dur="indefinite" restart="never" nodeType="tmRoot"/>
       </p:par>
     </p:tnLst>
   </p:timing>
@@ -9650,7 +9684,7 @@
   <p:timing>
     <p:tnLst>
       <p:par>
-        <p:cTn xmlns:p14="http://schemas.microsoft.com/office/powerpoint/2010/main" id="1" dur="indefinite" restart="never" nodeType="tmRoot"/>
+        <p:cTn id="1" dur="indefinite" restart="never" nodeType="tmRoot"/>
       </p:par>
     </p:tnLst>
   </p:timing>
@@ -9716,11 +9750,7 @@
             </a:pPr>
             <a:r>
               <a:rPr lang="en-US" sz="2400" dirty="0" smtClean="0"/>
-              <a:t>Finish </a:t>
-            </a:r>
-            <a:r>
-              <a:rPr lang="en-US" sz="2400" dirty="0" smtClean="0"/>
-              <a:t>coding Montalvo’s Book I and “synch” with Southey encoding. </a:t>
+              <a:t>Finish coding Montalvo’s Book I and “synch” with Southey encoding. </a:t>
             </a:r>
             <a:endParaRPr lang="en-US" sz="2400" dirty="0"/>
           </a:p>
@@ -9731,19 +9761,7 @@
             </a:pPr>
             <a:r>
               <a:rPr lang="en-US" sz="2400" dirty="0" smtClean="0"/>
-              <a:t>Classify </a:t>
-            </a:r>
-            <a:r>
-              <a:rPr lang="en-US" sz="2400" dirty="0" smtClean="0"/>
-              <a:t>the </a:t>
-            </a:r>
-            <a:r>
-              <a:rPr lang="en-US" sz="2400" dirty="0" smtClean="0"/>
-              <a:t>alterations </a:t>
-            </a:r>
-            <a:r>
-              <a:rPr lang="en-US" sz="2400" dirty="0" smtClean="0"/>
-              <a:t>Southey makes to Montalvo</a:t>
+              <a:t>Classify the alterations Southey makes to Montalvo</a:t>
             </a:r>
           </a:p>
           <a:p>
@@ -9790,15 +9808,7 @@
             </a:pPr>
             <a:r>
               <a:rPr lang="en-US" sz="2400" b="1" dirty="0" smtClean="0"/>
-              <a:t>What does </a:t>
-            </a:r>
-            <a:r>
-              <a:rPr lang="en-US" sz="2400" b="1" dirty="0" smtClean="0"/>
-              <a:t>life cycle </a:t>
-            </a:r>
-            <a:r>
-              <a:rPr lang="en-US" sz="2400" b="1" dirty="0" smtClean="0"/>
-              <a:t>and translation cycle of </a:t>
+              <a:t>What does life cycle and translation cycle of </a:t>
             </a:r>
             <a:r>
               <a:rPr lang="en-US" sz="2400" b="1" dirty="0" err="1" smtClean="0"/>
@@ -9829,7 +9839,7 @@
   <p:timing>
     <p:tnLst>
       <p:par>
-        <p:cTn xmlns:p14="http://schemas.microsoft.com/office/powerpoint/2010/main" id="1" dur="indefinite" restart="never" nodeType="tmRoot"/>
+        <p:cTn id="1" dur="indefinite" restart="never" nodeType="tmRoot"/>
       </p:par>
     </p:tnLst>
   </p:timing>
@@ -9976,11 +9986,7 @@
             </a:r>
             <a:r>
               <a:rPr lang="en-US" dirty="0" smtClean="0"/>
-              <a:t>(1508</a:t>
-            </a:r>
-            <a:r>
-              <a:rPr lang="en-US" dirty="0" smtClean="0"/>
-              <a:t>)</a:t>
+              <a:t>(1508)</a:t>
             </a:r>
           </a:p>
           <a:p>
@@ -9995,7 +10001,6 @@
               <a:rPr lang="en-US" dirty="0" smtClean="0"/>
               <a:t>Spanish editions (1526, 1533)</a:t>
             </a:r>
-            <a:endParaRPr lang="en-US" dirty="0" smtClean="0"/>
           </a:p>
           <a:p>
             <a:pPr marL="285750" indent="-285750">
@@ -10127,7 +10132,7 @@
   <p:timing>
     <p:tnLst>
       <p:par>
-        <p:cTn xmlns:p14="http://schemas.microsoft.com/office/powerpoint/2010/main" id="1" dur="indefinite" restart="never" nodeType="tmRoot"/>
+        <p:cTn id="1" dur="indefinite" restart="never" nodeType="tmRoot"/>
       </p:par>
     </p:tnLst>
   </p:timing>
@@ -10194,7 +10199,7 @@
   <p:timing>
     <p:tnLst>
       <p:par>
-        <p:cTn xmlns:p14="http://schemas.microsoft.com/office/powerpoint/2010/main" id="1" dur="indefinite" restart="never" nodeType="tmRoot"/>
+        <p:cTn id="1" dur="indefinite" restart="never" nodeType="tmRoot"/>
       </p:par>
     </p:tnLst>
   </p:timing>
@@ -10470,7 +10475,7 @@
   <p:timing>
     <p:tnLst>
       <p:par>
-        <p:cTn xmlns:p14="http://schemas.microsoft.com/office/powerpoint/2010/main" id="1" dur="indefinite" restart="never" nodeType="tmRoot"/>
+        <p:cTn id="1" dur="indefinite" restart="never" nodeType="tmRoot"/>
       </p:par>
     </p:tnLst>
   </p:timing>
@@ -10707,7 +10712,7 @@
   <p:timing>
     <p:tnLst>
       <p:par>
-        <p:cTn xmlns:p14="http://schemas.microsoft.com/office/powerpoint/2010/main" id="1" dur="indefinite" restart="never" nodeType="tmRoot"/>
+        <p:cTn id="1" dur="indefinite" restart="never" nodeType="tmRoot"/>
       </p:par>
     </p:tnLst>
   </p:timing>
@@ -10772,7 +10777,7 @@
   <p:timing>
     <p:tnLst>
       <p:par>
-        <p:cTn xmlns:p14="http://schemas.microsoft.com/office/powerpoint/2010/main" id="1" dur="indefinite" restart="never" nodeType="tmRoot"/>
+        <p:cTn id="1" dur="indefinite" restart="never" nodeType="tmRoot"/>
       </p:par>
     </p:tnLst>
   </p:timing>
@@ -10839,7 +10844,7 @@
   <p:timing>
     <p:tnLst>
       <p:par>
-        <p:cTn xmlns:p14="http://schemas.microsoft.com/office/powerpoint/2010/main" id="1" dur="indefinite" restart="never" nodeType="tmRoot"/>
+        <p:cTn id="1" dur="indefinite" restart="never" nodeType="tmRoot"/>
       </p:par>
     </p:tnLst>
   </p:timing>
@@ -10906,7 +10911,7 @@
   <p:timing>
     <p:tnLst>
       <p:par>
-        <p:cTn xmlns:p14="http://schemas.microsoft.com/office/powerpoint/2010/main" id="1" dur="indefinite" restart="never" nodeType="tmRoot"/>
+        <p:cTn id="1" dur="indefinite" restart="never" nodeType="tmRoot"/>
       </p:par>
     </p:tnLst>
   </p:timing>

</xml_diff>

<commit_message>
let's see if we can merge this
</commit_message>
<xml_diff>
--- a/Conference_prep/Amadis_tei_conf_images.pptx
+++ b/Conference_prep/Amadis_tei_conf_images.pptx
@@ -2407,7 +2407,11 @@
           <a:p>
             <a:r>
               <a:rPr lang="en-US" dirty="0" smtClean="0"/>
-              <a:t>From Southey’s 1803 edition of </a:t>
+              <a:t>Like a critical editor, Southey adds internal divisions to the text. From </a:t>
+            </a:r>
+            <a:r>
+              <a:rPr lang="en-US" dirty="0" smtClean="0"/>
+              <a:t>Southey’s 1803 edition of </a:t>
             </a:r>
             <a:r>
               <a:rPr lang="en-US" dirty="0" err="1" smtClean="0"/>
@@ -2423,7 +2427,15 @@
             </a:r>
             <a:r>
               <a:rPr lang="en-US" dirty="0" smtClean="0"/>
-              <a:t> Trust. Shows Southey’s internal divisions. From Chapter 1, in</a:t>
+              <a:t> Trust. </a:t>
+            </a:r>
+            <a:r>
+              <a:rPr lang="en-US" dirty="0" smtClean="0"/>
+              <a:t>From </a:t>
+            </a:r>
+            <a:r>
+              <a:rPr lang="en-US" dirty="0" smtClean="0"/>
+              <a:t>Chapter 1, in</a:t>
             </a:r>
             <a:r>
               <a:rPr lang="en-US" baseline="0" dirty="0" smtClean="0"/>

</xml_diff>

<commit_message>
small revisions to ppt notes
</commit_message>
<xml_diff>
--- a/Conference_prep/Amadis_tei_conf_images.pptx
+++ b/Conference_prep/Amadis_tei_conf_images.pptx
@@ -634,14 +634,30 @@
           <a:lstStyle/>
           <a:p>
             <a:r>
-              <a:rPr lang="en-US" dirty="0" smtClean="0"/>
-              <a:t>Elisa</a:t>
-            </a:r>
-            <a:r>
-              <a:rPr lang="en-US" baseline="0" dirty="0" smtClean="0"/>
-              <a:t> Segment: Discuss how we prepared the text in TEI for alignment, using Regex to add &lt;cl&gt; to Montalvo and &lt;s&gt; to Southey</a:t>
-            </a:r>
-            <a:endParaRPr lang="en-US" dirty="0"/>
+              <a:rPr lang="en-US" b="1" dirty="0" smtClean="0"/>
+              <a:t>Elisa:</a:t>
+            </a:r>
+            <a:r>
+              <a:rPr lang="en-US" b="1" baseline="0" dirty="0" smtClean="0"/>
+              <a:t>  Southey’s text is available from a </a:t>
+            </a:r>
+            <a:r>
+              <a:rPr lang="en-US" b="1" baseline="0" dirty="0" err="1" smtClean="0"/>
+              <a:t>GitHub</a:t>
+            </a:r>
+            <a:r>
+              <a:rPr lang="en-US" b="1" baseline="0" dirty="0" smtClean="0"/>
+              <a:t> source which we’ve been correcting against a published edition of his 1803 text. However, Montalvo’s text isn’t available in any machine readable format, so we’ve been transcribing that by hand. We then applied regular expressions to add &lt;cl&gt; elements at </a:t>
+            </a:r>
+            <a:r>
+              <a:rPr lang="en-US" b="1" baseline="0" dirty="0" err="1" smtClean="0"/>
+              <a:t>markable</a:t>
+            </a:r>
+            <a:r>
+              <a:rPr lang="en-US" b="1" baseline="0" dirty="0" smtClean="0"/>
+              <a:t> clause-like unit boundaries. (And of course we had an easier time with preparing &lt;s&gt; elements to Southey.</a:t>
+            </a:r>
+            <a:endParaRPr lang="en-US" b="1" dirty="0"/>
           </a:p>
         </p:txBody>
       </p:sp>
@@ -725,7 +741,15 @@
           <a:bodyPr/>
           <a:lstStyle/>
           <a:p>
-            <a:endParaRPr lang="en-US" dirty="0"/>
+            <a:r>
+              <a:rPr lang="en-US" b="1" dirty="0" smtClean="0"/>
+              <a:t>Elisa:</a:t>
+            </a:r>
+            <a:r>
+              <a:rPr lang="en-US" b="1" baseline="0" dirty="0" smtClean="0"/>
+              <a:t> We then wrote XSLT to construct human-readable XML:IDs sitting at the chapter and clause levels of the text. Floating texts were designated for representations of texts within the text, and they’re given distinct XML:ID to indicate their special status. </a:t>
+            </a:r>
+            <a:endParaRPr lang="en-US" b="1" dirty="0"/>
           </a:p>
         </p:txBody>
       </p:sp>
@@ -828,11 +852,35 @@
             </a:pPr>
             <a:r>
               <a:rPr lang="en-US" dirty="0" smtClean="0"/>
-              <a:t>Processing the alignment markup: What we’re learning so far</a:t>
+              <a:t>Elisa:</a:t>
             </a:r>
             <a:r>
               <a:rPr lang="en-US" baseline="0" dirty="0" smtClean="0"/>
-              <a:t>. As we are designing our website, we want to use this page as our table of  contents, so that site visitors can quickly identify the chapters most altered by Southey. The orange band in the center indicates the proportion of overlap. The word count comparisons interest us, though we are not sure how significant they are: We are interested in gauging the extent of Southey’s boasted “compression” of Montalvo, so we use XSLT to generate these graphs by counting white spaces for makeshift word counts in between &lt;anchor/&gt; elements of different kinds. Where Southey omitted passages we don’t apply tags, but we note where he skips over unit passages in Montalvo.</a:t>
+              <a:t> The next slides show our first results in comparing Southey’s translation to the Montalvo text. Here’s w</a:t>
+            </a:r>
+            <a:r>
+              <a:rPr lang="en-US" dirty="0" smtClean="0"/>
+              <a:t>hat </a:t>
+            </a:r>
+            <a:r>
+              <a:rPr lang="en-US" dirty="0" smtClean="0"/>
+              <a:t>we’re learning so far</a:t>
+            </a:r>
+            <a:r>
+              <a:rPr lang="en-US" baseline="0" dirty="0" smtClean="0"/>
+              <a:t>. As we are designing our website, we want to use this page as our table of  contents, so </a:t>
+            </a:r>
+            <a:r>
+              <a:rPr lang="en-US" baseline="0" dirty="0" smtClean="0"/>
+              <a:t>that our </a:t>
+            </a:r>
+            <a:r>
+              <a:rPr lang="en-US" baseline="0" dirty="0" smtClean="0"/>
+              <a:t>site visitors can quickly identify the chapters most altered by Southey. The orange band in the center indicates the proportion of overlap. The word count comparisons interest us, though we are not sure how significant they are: We are interested in gauging the extent of Southey’s boasted “compression” of Montalvo, so we use XSLT to generate these graphs by counting white spaces for makeshift word counts in between &lt;anchor/&gt; elements of different kinds. Where Southey omitted passages we don’t apply tags, but we note where he skips over unit passages in Montalvo</a:t>
+            </a:r>
+            <a:r>
+              <a:rPr lang="en-US" baseline="0" dirty="0" smtClean="0"/>
+              <a:t>. </a:t>
             </a:r>
             <a:endParaRPr lang="en-US" dirty="0" smtClean="0"/>
           </a:p>
@@ -922,22 +970,42 @@
           <a:lstStyle/>
           <a:p>
             <a:r>
-              <a:rPr lang="en-US" dirty="0" smtClean="0"/>
+              <a:rPr lang="en-US" b="0" dirty="0" smtClean="0"/>
               <a:t>To</a:t>
             </a:r>
             <a:r>
-              <a:rPr lang="en-US" baseline="0" dirty="0" smtClean="0"/>
-              <a:t> analyze the aligned passages further, and help Stacey to survey them to plot patterns, we use the TEI’s handy Feature Structure markup, to produce one Feature Structure file for each chapter. @n indicates a word count, and @</a:t>
-            </a:r>
-            <a:r>
-              <a:rPr lang="en-US" baseline="0" dirty="0" err="1" smtClean="0"/>
+              <a:rPr lang="en-US" b="0" baseline="0" dirty="0" smtClean="0"/>
+              <a:t> analyze the aligned passages further, and help Stacey to survey them to plot patterns, </a:t>
+            </a:r>
+            <a:r>
+              <a:rPr lang="en-US" b="0" baseline="0" dirty="0" smtClean="0"/>
+              <a:t>we make an additional TEI file corresponding to each chapter, using the TEI’s handy </a:t>
+            </a:r>
+            <a:r>
+              <a:rPr lang="en-US" b="1" baseline="0" dirty="0" smtClean="0"/>
+              <a:t>feature structures markup, </a:t>
+            </a:r>
+            <a:r>
+              <a:rPr lang="en-US" b="0" baseline="0" dirty="0" smtClean="0"/>
+              <a:t>to extract each Southey passage, and where it’s in sync, we set it next to the corresponding passage in Montalvo to produce </a:t>
+            </a:r>
+            <a:r>
+              <a:rPr lang="en-US" b="0" baseline="0" dirty="0" smtClean="0"/>
+              <a:t>one Feature Structure file for each chapter. @n indicates a word count, and @</a:t>
+            </a:r>
+            <a:r>
+              <a:rPr lang="en-US" b="0" baseline="0" dirty="0" err="1" smtClean="0"/>
               <a:t>ana</a:t>
             </a:r>
             <a:r>
-              <a:rPr lang="en-US" baseline="0" dirty="0" smtClean="0"/>
-              <a:t> indicates by how much proportionally the passage was either compressed or expanded from a corresponding passage in Montalvo. Within an fs element we pull each “anchored event” (so to speak) from Southey,, and where these are not additions or omissions, they contain side-by-side units of matched text. We add a &lt;string&gt; element for writing in our comments on the translation, and we plan to develop a system of classifying the kinds of alterations Southey makes in his version of the translation. For example (though this is not shown), we find that frequently Montalvo represents every speech-act directly, while Southey turns this in to indirect discourse. Other kinds of alterations to syntax.</a:t>
-            </a:r>
-            <a:endParaRPr lang="en-US" dirty="0"/>
+              <a:rPr lang="en-US" b="0" baseline="0" dirty="0" smtClean="0"/>
+              <a:t> indicates by how much proportionally the passage was either compressed or expanded from a corresponding passage in Montalvo. Within an fs element we pull each “anchored event” (so to speak) from Southey,, and where these are not additions or omissions, they contain side-by-side units of matched text. We add a &lt;string&gt; element for writing in our comments on the translation, and we plan to develop a system of classifying the kinds of alterations Southey makes in his version of the translation. For example (though this is not shown), we find that frequently Montalvo represents every speech-act directly, while Southey turns this in to indirect discourse. </a:t>
+            </a:r>
+            <a:r>
+              <a:rPr lang="en-US" b="0" baseline="0" dirty="0" smtClean="0"/>
+              <a:t>He is likely making changes in the syntax, too. </a:t>
+            </a:r>
+            <a:endParaRPr lang="en-US" b="0" dirty="0"/>
           </a:p>
         </p:txBody>
       </p:sp>
@@ -1043,11 +1111,7 @@
             </a:r>
             <a:r>
               <a:rPr lang="en-US" baseline="0" dirty="0" smtClean="0"/>
-              <a:t>, our signal of proportional difference in size between Montalvo and Southey. (The function round-half-to-even() can take two arguments—the “2” at the end indicates the number of decimal places</a:t>
-            </a:r>
-            <a:r>
-              <a:rPr lang="en-US" baseline="0" dirty="0" smtClean="0"/>
-              <a:t>.)</a:t>
+              <a:t>, our signal of proportional difference in size between Montalvo and Southey. (The function round-half-to-even() can take two arguments—the “2” at the end indicates the number of decimal places.)</a:t>
             </a:r>
             <a:endParaRPr lang="en-US" b="1" dirty="0"/>
           </a:p>
@@ -1147,11 +1211,7 @@
             </a:r>
             <a:r>
               <a:rPr lang="en-US" baseline="0" dirty="0" smtClean="0"/>
-              <a:t> Sabel: This is an HTML view pulled from our feature structures markup for a chapter. The higher the number, the more compression Southey applied</a:t>
-            </a:r>
-            <a:r>
-              <a:rPr lang="en-US" baseline="0" dirty="0" smtClean="0"/>
-              <a:t>.</a:t>
+              <a:t> Sabel: This is an HTML view pulled from our feature structures markup for a chapter. The higher the number, the more compression Southey applied.</a:t>
             </a:r>
           </a:p>
           <a:p>
@@ -2568,18 +2628,22 @@
               <a:t>Elisa: </a:t>
             </a:r>
             <a:r>
-              <a:rPr lang="en-US" baseline="0" dirty="0" smtClean="0"/>
-              <a:t>Begin segment, explaining the reason why we coded this way—AVOIDING hierarchies of nested clauses even where we could spot dependent clauses: We sacrificed the preparation of accurate syntactical markup for our research question in favor of aligning the two texts. So each “clause-like” unit is a sort of </a:t>
-            </a:r>
-            <a:r>
-              <a:rPr lang="en-US" baseline="0" dirty="0" err="1" smtClean="0"/>
+              <a:rPr lang="en-US" b="1" baseline="0" dirty="0" smtClean="0"/>
+              <a:t>We had a difficult decision to make about this clause markup when we started this project. We would often see dependent clauses within Montalvo that we wanted to nest, but we decided to AVOID generating hierarchies here: </a:t>
+            </a:r>
+            <a:r>
+              <a:rPr lang="en-US" b="1" baseline="0" dirty="0" smtClean="0"/>
+              <a:t>We sacrificed the preparation of accurate syntactical markup for our research question in favor of aligning the two texts. So each “clause-like” unit is a sort of </a:t>
+            </a:r>
+            <a:r>
+              <a:rPr lang="en-US" b="1" baseline="0" dirty="0" err="1" smtClean="0"/>
               <a:t>geocoordinate</a:t>
             </a:r>
             <a:r>
-              <a:rPr lang="en-US" baseline="0" dirty="0" smtClean="0"/>
+              <a:rPr lang="en-US" b="1" baseline="0" dirty="0" smtClean="0"/>
               <a:t> reference to which we can map portions of Southey’s text. </a:t>
             </a:r>
-            <a:endParaRPr lang="en-US" dirty="0"/>
+            <a:endParaRPr lang="en-US" b="1" dirty="0"/>
           </a:p>
         </p:txBody>
       </p:sp>
@@ -2664,42 +2728,86 @@
           <a:lstStyle/>
           <a:p>
             <a:r>
-              <a:rPr lang="en-US" b="1" dirty="0" smtClean="0"/>
+              <a:rPr lang="en-US" sz="1600" b="1" dirty="0" smtClean="0"/>
               <a:t>Alignment coding: </a:t>
             </a:r>
             <a:r>
-              <a:rPr lang="en-US" dirty="0" smtClean="0"/>
+              <a:rPr lang="en-US" sz="1600" dirty="0" smtClean="0"/>
               <a:t>Southey</a:t>
             </a:r>
             <a:r>
-              <a:rPr lang="en-US" baseline="0" dirty="0" smtClean="0"/>
-              <a:t> aligned to Montalvo with self-closing anchor elements. These mark with @synch alignment points with Montalvo. (We aren’t using </a:t>
-            </a:r>
-            <a:r>
-              <a:rPr lang="en-US" baseline="0" dirty="0" err="1" smtClean="0"/>
+              <a:rPr lang="en-US" sz="1600" baseline="0" dirty="0" smtClean="0"/>
+              <a:t> aligned to Montalvo with self-closing anchor elements. These mark with @synch alignment points with Montalvo. </a:t>
+            </a:r>
+            <a:r>
+              <a:rPr lang="en-US" sz="1600" b="1" baseline="0" dirty="0" smtClean="0">
+                <a:solidFill>
+                  <a:srgbClr val="FF0000"/>
+                </a:solidFill>
+              </a:rPr>
+              <a:t>(ELISA: We </a:t>
+            </a:r>
+            <a:r>
+              <a:rPr lang="en-US" sz="1600" b="1" baseline="0" dirty="0" smtClean="0">
+                <a:solidFill>
+                  <a:srgbClr val="FF0000"/>
+                </a:solidFill>
+              </a:rPr>
+              <a:t>aren’t using </a:t>
+            </a:r>
+            <a:r>
+              <a:rPr lang="en-US" sz="1600" b="1" baseline="0" dirty="0" err="1" smtClean="0">
+                <a:solidFill>
+                  <a:srgbClr val="FF0000"/>
+                </a:solidFill>
+              </a:rPr>
               <a:t>xml:ids</a:t>
             </a:r>
             <a:r>
-              <a:rPr lang="en-US" baseline="0" dirty="0" smtClean="0"/>
+              <a:rPr lang="en-US" sz="1600" b="1" baseline="0" dirty="0" smtClean="0">
+                <a:solidFill>
+                  <a:srgbClr val="FF0000"/>
+                </a:solidFill>
+              </a:rPr>
               <a:t> on Southey’s sentences, but we use this markup to “tether” </a:t>
             </a:r>
             <a:r>
-              <a:rPr lang="en-US" baseline="0" dirty="0" err="1" smtClean="0"/>
+              <a:rPr lang="en-US" sz="1600" b="1" baseline="0" dirty="0" err="1" smtClean="0">
+                <a:solidFill>
+                  <a:srgbClr val="FF0000"/>
+                </a:solidFill>
+              </a:rPr>
               <a:t>pssages</a:t>
             </a:r>
             <a:r>
-              <a:rPr lang="en-US" baseline="0" dirty="0" smtClean="0"/>
+              <a:rPr lang="en-US" sz="1600" b="1" baseline="0" dirty="0" smtClean="0">
+                <a:solidFill>
+                  <a:srgbClr val="FF0000"/>
+                </a:solidFill>
+              </a:rPr>
               <a:t> of the </a:t>
             </a:r>
             <a:r>
-              <a:rPr lang="en-US" baseline="0" dirty="0" err="1" smtClean="0"/>
-              <a:t>southye</a:t>
-            </a:r>
-            <a:r>
-              <a:rPr lang="en-US" baseline="0" dirty="0" smtClean="0"/>
-              <a:t> text with Montalvo. We find there are often multiple units per sentence, and we use the self-closing elements so that units can cross sentences boundaries.</a:t>
-            </a:r>
-            <a:endParaRPr lang="en-US" dirty="0"/>
+              <a:rPr lang="en-US" sz="1600" b="1" baseline="0" dirty="0" smtClean="0">
+                <a:solidFill>
+                  <a:srgbClr val="FF0000"/>
+                </a:solidFill>
+              </a:rPr>
+              <a:t>Southey </a:t>
+            </a:r>
+            <a:r>
+              <a:rPr lang="en-US" sz="1600" b="1" baseline="0" dirty="0" smtClean="0">
+                <a:solidFill>
+                  <a:srgbClr val="FF0000"/>
+                </a:solidFill>
+              </a:rPr>
+              <a:t>text with Montalvo. We find there are often multiple units per sentence, and we use the self-closing elements so that units can cross sentences boundaries.</a:t>
+            </a:r>
+            <a:endParaRPr lang="en-US" sz="1600" b="1" dirty="0">
+              <a:solidFill>
+                <a:srgbClr val="FF0000"/>
+              </a:solidFill>
+            </a:endParaRPr>
           </a:p>
         </p:txBody>
       </p:sp>
@@ -10893,7 +11001,7 @@
         </p:blipFill>
         <p:spPr>
           <a:xfrm>
-            <a:off x="1" y="269631"/>
+            <a:off x="1" y="281354"/>
             <a:ext cx="8299938" cy="5713686"/>
           </a:xfrm>
         </p:spPr>

</xml_diff>

<commit_message>
small correction to conference slides
</commit_message>
<xml_diff>
--- a/Conference_prep/Amadis_tei_conf_images.pptx
+++ b/Conference_prep/Amadis_tei_conf_images.pptx
@@ -130,7 +130,7 @@
   </p:defaultTextStyle>
   <p:extLst>
     <p:ext uri="{EFAFB233-063F-42B5-8137-9DF3F51BA10A}">
-      <p15:sldGuideLst xmlns:p15="http://schemas.microsoft.com/office/powerpoint/2012/main">
+      <p15:sldGuideLst xmlns:p15="http://schemas.microsoft.com/office/powerpoint/2012/main" xmlns="">
         <p15:guide id="1" orient="horz" pos="2160">
           <p15:clr>
             <a:srgbClr val="A4A3A4"/>
@@ -229,7 +229,7 @@
           <a:p>
             <a:fld id="{1567ADDC-A5F7-6948-9B24-2C078ECBC864}" type="datetimeFigureOut">
               <a:rPr lang="en-US" smtClean="0"/>
-              <a:t>10/31/2015</a:t>
+              <a:t>6/8/16</a:t>
             </a:fld>
             <a:endParaRPr lang="en-US"/>
           </a:p>
@@ -1716,8 +1716,13 @@
             </a:r>
             <a:r>
               <a:rPr lang="en-US" baseline="0" dirty="0" smtClean="0"/>
-              <a:t> age</a:t>
-            </a:r>
+              <a:t> </a:t>
+            </a:r>
+            <a:r>
+              <a:rPr lang="en-US" baseline="0" dirty="0" smtClean="0"/>
+              <a:t>page</a:t>
+            </a:r>
+            <a:endParaRPr lang="en-US" baseline="0" dirty="0" smtClean="0"/>
           </a:p>
           <a:p>
             <a:r>
@@ -2597,23 +2602,7 @@
             </a:r>
             <a:r>
               <a:rPr lang="en-US" b="1" baseline="0" dirty="0" smtClean="0"/>
-              <a:t>Elisa: We had a difficult decision to make about this clause markup when we started this project. We would often see dependent clauses within Montalvo that we wanted to nest, but we decided to AVOID generating </a:t>
-            </a:r>
-            <a:r>
-              <a:rPr lang="en-US" b="1" baseline="0" dirty="0" smtClean="0"/>
-              <a:t>nested hierarchies </a:t>
-            </a:r>
-            <a:r>
-              <a:rPr lang="en-US" b="1" baseline="0" dirty="0" smtClean="0"/>
-              <a:t>here: We sacrificed the preparation of accurate syntactical markup for our research question in favor of aligning the two texts. So each “clause-like” unit </a:t>
-            </a:r>
-            <a:r>
-              <a:rPr lang="en-US" b="1" baseline="0" dirty="0" smtClean="0"/>
-              <a:t>is a sibling in the XML hierarchy is </a:t>
-            </a:r>
-            <a:r>
-              <a:rPr lang="en-US" b="1" baseline="0" dirty="0" smtClean="0"/>
-              <a:t>a sort of </a:t>
+              <a:t>Elisa: We had a difficult decision to make about this clause markup when we started this project. We would often see dependent clauses within Montalvo that we wanted to nest, but we decided to AVOID generating nested hierarchies here: We sacrificed the preparation of accurate syntactical markup for our research question in favor of aligning the two texts. So each “clause-like” unit is a sibling in the XML hierarchy is a sort of </a:t>
             </a:r>
             <a:r>
               <a:rPr lang="en-US" b="1" baseline="0" dirty="0" err="1" smtClean="0"/>
@@ -2621,11 +2610,7 @@
             </a:r>
             <a:r>
               <a:rPr lang="en-US" b="1" baseline="0" dirty="0" smtClean="0"/>
-              <a:t> reference to which we can map portions of Southey’s text. </a:t>
-            </a:r>
-            <a:r>
-              <a:rPr lang="en-US" b="1" baseline="0" dirty="0" smtClean="0"/>
-              <a:t>This makes it easier for us to reveal when Southey reverses clause order, weaves two of Montalvo’s units together, or jumps ahead or back in Montalvo’s text. </a:t>
+              <a:t> reference to which we can map portions of Southey’s text. This makes it easier for us to reveal when Southey reverses clause order, weaves two of Montalvo’s units together, or jumps ahead or back in Montalvo’s text. </a:t>
             </a:r>
             <a:endParaRPr lang="en-US" b="1" dirty="0"/>
           </a:p>
@@ -2745,23 +2730,7 @@
                   <a:srgbClr val="FF0000"/>
                 </a:solidFill>
               </a:rPr>
-              <a:t> on Southey’s sentences, but we use this markup to “tether” </a:t>
-            </a:r>
-            <a:r>
-              <a:rPr lang="en-US" sz="1600" b="1" baseline="0" dirty="0" smtClean="0">
-                <a:solidFill>
-                  <a:srgbClr val="FF0000"/>
-                </a:solidFill>
-              </a:rPr>
-              <a:t>passages </a:t>
-            </a:r>
-            <a:r>
-              <a:rPr lang="en-US" sz="1600" b="1" baseline="0" dirty="0" smtClean="0">
-                <a:solidFill>
-                  <a:srgbClr val="FF0000"/>
-                </a:solidFill>
-              </a:rPr>
-              <a:t>of the Southey text with Montalvo. We find there are often multiple units per sentence, and we use the self-closing elements so that units can cross sentences boundaries.</a:t>
+              <a:t> on Southey’s sentences, but we use this markup to “tether” passages of the Southey text with Montalvo. We find there are often multiple units per sentence, and we use the self-closing elements so that units can cross sentences boundaries.</a:t>
             </a:r>
             <a:endParaRPr lang="en-US" sz="1600" b="1" dirty="0">
               <a:solidFill>
@@ -2995,7 +2964,7 @@
           <a:p>
             <a:fld id="{6BFECD78-3C8E-49F2-8FAB-59489D168ABB}" type="datetimeFigureOut">
               <a:rPr lang="en-US" smtClean="0"/>
-              <a:t>10/31/2015</a:t>
+              <a:t>6/8/16</a:t>
             </a:fld>
             <a:endParaRPr lang="en-US"/>
           </a:p>
@@ -3196,7 +3165,7 @@
           <a:p>
             <a:fld id="{6BFECD78-3C8E-49F2-8FAB-59489D168ABB}" type="datetimeFigureOut">
               <a:rPr lang="en-US" smtClean="0"/>
-              <a:t>10/31/2015</a:t>
+              <a:t>6/8/16</a:t>
             </a:fld>
             <a:endParaRPr lang="en-US"/>
           </a:p>
@@ -3371,7 +3340,7 @@
           <a:p>
             <a:fld id="{6BFECD78-3C8E-49F2-8FAB-59489D168ABB}" type="datetimeFigureOut">
               <a:rPr lang="en-US" smtClean="0"/>
-              <a:t>10/31/2015</a:t>
+              <a:t>6/8/16</a:t>
             </a:fld>
             <a:endParaRPr lang="en-US"/>
           </a:p>
@@ -3536,7 +3505,7 @@
           <a:p>
             <a:fld id="{6BFECD78-3C8E-49F2-8FAB-59489D168ABB}" type="datetimeFigureOut">
               <a:rPr lang="en-US" smtClean="0"/>
-              <a:t>10/31/2015</a:t>
+              <a:t>6/8/16</a:t>
             </a:fld>
             <a:endParaRPr lang="en-US"/>
           </a:p>
@@ -3784,7 +3753,7 @@
           <a:p>
             <a:fld id="{6BFECD78-3C8E-49F2-8FAB-59489D168ABB}" type="datetimeFigureOut">
               <a:rPr lang="en-US" smtClean="0"/>
-              <a:t>10/31/2015</a:t>
+              <a:t>6/8/16</a:t>
             </a:fld>
             <a:endParaRPr lang="en-US"/>
           </a:p>
@@ -4102,7 +4071,7 @@
           <a:p>
             <a:fld id="{6BFECD78-3C8E-49F2-8FAB-59489D168ABB}" type="datetimeFigureOut">
               <a:rPr lang="en-US" smtClean="0"/>
-              <a:t>10/31/2015</a:t>
+              <a:t>6/8/16</a:t>
             </a:fld>
             <a:endParaRPr lang="en-US"/>
           </a:p>
@@ -4568,7 +4537,7 @@
           <a:p>
             <a:fld id="{6BFECD78-3C8E-49F2-8FAB-59489D168ABB}" type="datetimeFigureOut">
               <a:rPr lang="en-US" smtClean="0"/>
-              <a:t>10/31/2015</a:t>
+              <a:t>6/8/16</a:t>
             </a:fld>
             <a:endParaRPr lang="en-US"/>
           </a:p>
@@ -4716,7 +4685,7 @@
           <a:p>
             <a:fld id="{6BFECD78-3C8E-49F2-8FAB-59489D168ABB}" type="datetimeFigureOut">
               <a:rPr lang="en-US" smtClean="0"/>
-              <a:t>10/31/2015</a:t>
+              <a:t>6/8/16</a:t>
             </a:fld>
             <a:endParaRPr lang="en-US"/>
           </a:p>
@@ -4806,7 +4775,7 @@
           <a:p>
             <a:fld id="{6BFECD78-3C8E-49F2-8FAB-59489D168ABB}" type="datetimeFigureOut">
               <a:rPr lang="en-US" smtClean="0"/>
-              <a:t>10/31/2015</a:t>
+              <a:t>6/8/16</a:t>
             </a:fld>
             <a:endParaRPr lang="en-US"/>
           </a:p>
@@ -5080,7 +5049,7 @@
           <a:p>
             <a:fld id="{6BFECD78-3C8E-49F2-8FAB-59489D168ABB}" type="datetimeFigureOut">
               <a:rPr lang="en-US" smtClean="0"/>
-              <a:t>10/31/2015</a:t>
+              <a:t>6/8/16</a:t>
             </a:fld>
             <a:endParaRPr lang="en-US"/>
           </a:p>
@@ -5386,7 +5355,7 @@
           <a:p>
             <a:fld id="{6BFECD78-3C8E-49F2-8FAB-59489D168ABB}" type="datetimeFigureOut">
               <a:rPr lang="en-US" smtClean="0"/>
-              <a:t>10/31/2015</a:t>
+              <a:t>6/8/16</a:t>
             </a:fld>
             <a:endParaRPr lang="en-US"/>
           </a:p>
@@ -5684,7 +5653,7 @@
           <a:p>
             <a:fld id="{6BFECD78-3C8E-49F2-8FAB-59489D168ABB}" type="datetimeFigureOut">
               <a:rPr lang="en-US" smtClean="0"/>
-              <a:t>10/31/2015</a:t>
+              <a:t>6/8/16</a:t>
             </a:fld>
             <a:endParaRPr lang="en-US"/>
           </a:p>
@@ -6270,7 +6239,7 @@
   <p:timing>
     <p:tnLst>
       <p:par>
-        <p:cTn id="1" dur="indefinite" restart="never" nodeType="tmRoot"/>
+        <p:cTn xmlns:p14="http://schemas.microsoft.com/office/powerpoint/2010/main" id="1" dur="indefinite" restart="never" nodeType="tmRoot"/>
       </p:par>
     </p:tnLst>
   </p:timing>
@@ -6431,7 +6400,7 @@
   <p:timing>
     <p:tnLst>
       <p:par>
-        <p:cTn id="1" dur="indefinite" restart="never" nodeType="tmRoot"/>
+        <p:cTn xmlns:p14="http://schemas.microsoft.com/office/powerpoint/2010/main" id="1" dur="indefinite" restart="never" nodeType="tmRoot"/>
       </p:par>
     </p:tnLst>
   </p:timing>
@@ -6788,7 +6757,7 @@
   <p:timing>
     <p:tnLst>
       <p:par>
-        <p:cTn id="1" dur="indefinite" restart="never" nodeType="tmRoot"/>
+        <p:cTn xmlns:p14="http://schemas.microsoft.com/office/powerpoint/2010/main" id="1" dur="indefinite" restart="never" nodeType="tmRoot"/>
       </p:par>
     </p:tnLst>
   </p:timing>
@@ -8149,7 +8118,7 @@
   <p:timing>
     <p:tnLst>
       <p:par>
-        <p:cTn id="1" dur="indefinite" restart="never" nodeType="tmRoot"/>
+        <p:cTn xmlns:p14="http://schemas.microsoft.com/office/powerpoint/2010/main" id="1" dur="indefinite" restart="never" nodeType="tmRoot"/>
       </p:par>
     </p:tnLst>
   </p:timing>
@@ -8210,7 +8179,7 @@
   <p:timing>
     <p:tnLst>
       <p:par>
-        <p:cTn id="1" dur="indefinite" restart="never" nodeType="tmRoot"/>
+        <p:cTn xmlns:p14="http://schemas.microsoft.com/office/powerpoint/2010/main" id="1" dur="indefinite" restart="never" nodeType="tmRoot"/>
       </p:par>
     </p:tnLst>
   </p:timing>
@@ -8275,7 +8244,7 @@
   <p:timing>
     <p:tnLst>
       <p:par>
-        <p:cTn id="1" dur="indefinite" restart="never" nodeType="tmRoot"/>
+        <p:cTn xmlns:p14="http://schemas.microsoft.com/office/powerpoint/2010/main" id="1" dur="indefinite" restart="never" nodeType="tmRoot"/>
       </p:par>
     </p:tnLst>
   </p:timing>
@@ -9149,7 +9118,7 @@
   <p:timing>
     <p:tnLst>
       <p:par>
-        <p:cTn id="1" dur="indefinite" restart="never" nodeType="tmRoot"/>
+        <p:cTn xmlns:p14="http://schemas.microsoft.com/office/powerpoint/2010/main" id="1" dur="indefinite" restart="never" nodeType="tmRoot"/>
       </p:par>
     </p:tnLst>
   </p:timing>
@@ -9216,7 +9185,7 @@
   <p:timing>
     <p:tnLst>
       <p:par>
-        <p:cTn id="1" dur="indefinite" restart="never" nodeType="tmRoot"/>
+        <p:cTn xmlns:p14="http://schemas.microsoft.com/office/powerpoint/2010/main" id="1" dur="indefinite" restart="never" nodeType="tmRoot"/>
       </p:par>
     </p:tnLst>
   </p:timing>
@@ -9332,7 +9301,7 @@
   <p:timing>
     <p:tnLst>
       <p:par>
-        <p:cTn id="1" dur="indefinite" restart="never" nodeType="tmRoot"/>
+        <p:cTn xmlns:p14="http://schemas.microsoft.com/office/powerpoint/2010/main" id="1" dur="indefinite" restart="never" nodeType="tmRoot"/>
       </p:par>
     </p:tnLst>
   </p:timing>
@@ -9399,7 +9368,7 @@
   <p:timing>
     <p:tnLst>
       <p:par>
-        <p:cTn id="1" dur="indefinite" restart="never" nodeType="tmRoot"/>
+        <p:cTn xmlns:p14="http://schemas.microsoft.com/office/powerpoint/2010/main" id="1" dur="indefinite" restart="never" nodeType="tmRoot"/>
       </p:par>
     </p:tnLst>
   </p:timing>
@@ -9466,7 +9435,7 @@
   <p:timing>
     <p:tnLst>
       <p:par>
-        <p:cTn id="1" dur="indefinite" restart="never" nodeType="tmRoot"/>
+        <p:cTn xmlns:p14="http://schemas.microsoft.com/office/powerpoint/2010/main" id="1" dur="indefinite" restart="never" nodeType="tmRoot"/>
       </p:par>
     </p:tnLst>
   </p:timing>
@@ -9593,7 +9562,7 @@
   <p:timing>
     <p:tnLst>
       <p:par>
-        <p:cTn id="1" dur="indefinite" restart="never" nodeType="tmRoot"/>
+        <p:cTn xmlns:p14="http://schemas.microsoft.com/office/powerpoint/2010/main" id="1" dur="indefinite" restart="never" nodeType="tmRoot"/>
       </p:par>
     </p:tnLst>
   </p:timing>
@@ -9655,7 +9624,7 @@
   <p:timing>
     <p:tnLst>
       <p:par>
-        <p:cTn id="1" dur="indefinite" restart="never" nodeType="tmRoot"/>
+        <p:cTn xmlns:p14="http://schemas.microsoft.com/office/powerpoint/2010/main" id="1" dur="indefinite" restart="never" nodeType="tmRoot"/>
       </p:par>
     </p:tnLst>
   </p:timing>
@@ -9752,7 +9721,7 @@
   <p:timing>
     <p:tnLst>
       <p:par>
-        <p:cTn id="1" dur="indefinite" restart="never" nodeType="tmRoot"/>
+        <p:cTn xmlns:p14="http://schemas.microsoft.com/office/powerpoint/2010/main" id="1" dur="indefinite" restart="never" nodeType="tmRoot"/>
       </p:par>
     </p:tnLst>
   </p:timing>
@@ -9907,7 +9876,7 @@
   <p:timing>
     <p:tnLst>
       <p:par>
-        <p:cTn id="1" dur="indefinite" restart="never" nodeType="tmRoot"/>
+        <p:cTn xmlns:p14="http://schemas.microsoft.com/office/powerpoint/2010/main" id="1" dur="indefinite" restart="never" nodeType="tmRoot"/>
       </p:par>
     </p:tnLst>
   </p:timing>
@@ -10200,7 +10169,7 @@
   <p:timing>
     <p:tnLst>
       <p:par>
-        <p:cTn id="1" dur="indefinite" restart="never" nodeType="tmRoot"/>
+        <p:cTn xmlns:p14="http://schemas.microsoft.com/office/powerpoint/2010/main" id="1" dur="indefinite" restart="never" nodeType="tmRoot"/>
       </p:par>
     </p:tnLst>
   </p:timing>
@@ -10267,7 +10236,7 @@
   <p:timing>
     <p:tnLst>
       <p:par>
-        <p:cTn id="1" dur="indefinite" restart="never" nodeType="tmRoot"/>
+        <p:cTn xmlns:p14="http://schemas.microsoft.com/office/powerpoint/2010/main" id="1" dur="indefinite" restart="never" nodeType="tmRoot"/>
       </p:par>
     </p:tnLst>
   </p:timing>
@@ -10543,7 +10512,7 @@
   <p:timing>
     <p:tnLst>
       <p:par>
-        <p:cTn id="1" dur="indefinite" restart="never" nodeType="tmRoot"/>
+        <p:cTn xmlns:p14="http://schemas.microsoft.com/office/powerpoint/2010/main" id="1" dur="indefinite" restart="never" nodeType="tmRoot"/>
       </p:par>
     </p:tnLst>
   </p:timing>
@@ -10780,7 +10749,7 @@
   <p:timing>
     <p:tnLst>
       <p:par>
-        <p:cTn id="1" dur="indefinite" restart="never" nodeType="tmRoot"/>
+        <p:cTn xmlns:p14="http://schemas.microsoft.com/office/powerpoint/2010/main" id="1" dur="indefinite" restart="never" nodeType="tmRoot"/>
       </p:par>
     </p:tnLst>
   </p:timing>
@@ -10845,7 +10814,7 @@
   <p:timing>
     <p:tnLst>
       <p:par>
-        <p:cTn id="1" dur="indefinite" restart="never" nodeType="tmRoot"/>
+        <p:cTn xmlns:p14="http://schemas.microsoft.com/office/powerpoint/2010/main" id="1" dur="indefinite" restart="never" nodeType="tmRoot"/>
       </p:par>
     </p:tnLst>
   </p:timing>
@@ -10912,7 +10881,7 @@
   <p:timing>
     <p:tnLst>
       <p:par>
-        <p:cTn id="1" dur="indefinite" restart="never" nodeType="tmRoot"/>
+        <p:cTn xmlns:p14="http://schemas.microsoft.com/office/powerpoint/2010/main" id="1" dur="indefinite" restart="never" nodeType="tmRoot"/>
       </p:par>
     </p:tnLst>
   </p:timing>
@@ -10979,7 +10948,7 @@
   <p:timing>
     <p:tnLst>
       <p:par>
-        <p:cTn id="1" dur="indefinite" restart="never" nodeType="tmRoot"/>
+        <p:cTn xmlns:p14="http://schemas.microsoft.com/office/powerpoint/2010/main" id="1" dur="indefinite" restart="never" nodeType="tmRoot"/>
       </p:par>
     </p:tnLst>
   </p:timing>

</xml_diff>